<commit_message>
Project Solo GIG V1.0
</commit_message>
<xml_diff>
--- a/Guess Images Game.pptx
+++ b/Guess Images Game.pptx
@@ -6,16 +6,17 @@
   </p:sldMasterIdLst>
   <p:sldIdLst>
     <p:sldId id="256" r:id="rId2"/>
-    <p:sldId id="257" r:id="rId3"/>
-    <p:sldId id="258" r:id="rId4"/>
-    <p:sldId id="259" r:id="rId5"/>
-    <p:sldId id="260" r:id="rId6"/>
-    <p:sldId id="261" r:id="rId7"/>
-    <p:sldId id="262" r:id="rId8"/>
-    <p:sldId id="263" r:id="rId9"/>
-    <p:sldId id="266" r:id="rId10"/>
-    <p:sldId id="264" r:id="rId11"/>
-    <p:sldId id="265" r:id="rId12"/>
+    <p:sldId id="267" r:id="rId3"/>
+    <p:sldId id="266" r:id="rId4"/>
+    <p:sldId id="257" r:id="rId5"/>
+    <p:sldId id="258" r:id="rId6"/>
+    <p:sldId id="259" r:id="rId7"/>
+    <p:sldId id="260" r:id="rId8"/>
+    <p:sldId id="261" r:id="rId9"/>
+    <p:sldId id="262" r:id="rId10"/>
+    <p:sldId id="263" r:id="rId11"/>
+    <p:sldId id="264" r:id="rId12"/>
+    <p:sldId id="265" r:id="rId13"/>
   </p:sldIdLst>
   <p:sldSz cx="9144000" cy="6858000" type="screen4x3"/>
   <p:notesSz cx="6858000" cy="9144000"/>
@@ -298,7 +299,8 @@
           <a:p>
             <a:fld id="{1D335D60-1EC8-4A7B-BBFF-EAF7C09BAE92}" type="datetimeFigureOut">
               <a:rPr lang="fr-FR" smtClean="0"/>
-              <a:t>18/08/2022</a:t>
+              <a:pPr/>
+              <a:t>19/08/2022</a:t>
             </a:fld>
             <a:endParaRPr lang="fr-FR"/>
           </a:p>
@@ -340,6 +342,7 @@
           <a:p>
             <a:fld id="{BEFB0128-7FEF-4DF6-B73E-960936029295}" type="slidenum">
               <a:rPr lang="fr-FR" smtClean="0"/>
+              <a:pPr/>
               <a:t>‹N°›</a:t>
             </a:fld>
             <a:endParaRPr lang="fr-FR"/>
@@ -463,7 +466,8 @@
           <a:p>
             <a:fld id="{1D335D60-1EC8-4A7B-BBFF-EAF7C09BAE92}" type="datetimeFigureOut">
               <a:rPr lang="fr-FR" smtClean="0"/>
-              <a:t>18/08/2022</a:t>
+              <a:pPr/>
+              <a:t>19/08/2022</a:t>
             </a:fld>
             <a:endParaRPr lang="fr-FR"/>
           </a:p>
@@ -505,6 +509,7 @@
           <a:p>
             <a:fld id="{BEFB0128-7FEF-4DF6-B73E-960936029295}" type="slidenum">
               <a:rPr lang="fr-FR" smtClean="0"/>
+              <a:pPr/>
               <a:t>‹N°›</a:t>
             </a:fld>
             <a:endParaRPr lang="fr-FR"/>
@@ -638,7 +643,8 @@
           <a:p>
             <a:fld id="{1D335D60-1EC8-4A7B-BBFF-EAF7C09BAE92}" type="datetimeFigureOut">
               <a:rPr lang="fr-FR" smtClean="0"/>
-              <a:t>18/08/2022</a:t>
+              <a:pPr/>
+              <a:t>19/08/2022</a:t>
             </a:fld>
             <a:endParaRPr lang="fr-FR"/>
           </a:p>
@@ -680,6 +686,7 @@
           <a:p>
             <a:fld id="{BEFB0128-7FEF-4DF6-B73E-960936029295}" type="slidenum">
               <a:rPr lang="fr-FR" smtClean="0"/>
+              <a:pPr/>
               <a:t>‹N°›</a:t>
             </a:fld>
             <a:endParaRPr lang="fr-FR"/>
@@ -803,7 +810,8 @@
           <a:p>
             <a:fld id="{1D335D60-1EC8-4A7B-BBFF-EAF7C09BAE92}" type="datetimeFigureOut">
               <a:rPr lang="fr-FR" smtClean="0"/>
-              <a:t>18/08/2022</a:t>
+              <a:pPr/>
+              <a:t>19/08/2022</a:t>
             </a:fld>
             <a:endParaRPr lang="fr-FR"/>
           </a:p>
@@ -845,6 +853,7 @@
           <a:p>
             <a:fld id="{BEFB0128-7FEF-4DF6-B73E-960936029295}" type="slidenum">
               <a:rPr lang="fr-FR" smtClean="0"/>
+              <a:pPr/>
               <a:t>‹N°›</a:t>
             </a:fld>
             <a:endParaRPr lang="fr-FR"/>
@@ -1044,7 +1053,8 @@
           <a:p>
             <a:fld id="{1D335D60-1EC8-4A7B-BBFF-EAF7C09BAE92}" type="datetimeFigureOut">
               <a:rPr lang="fr-FR" smtClean="0"/>
-              <a:t>18/08/2022</a:t>
+              <a:pPr/>
+              <a:t>19/08/2022</a:t>
             </a:fld>
             <a:endParaRPr lang="fr-FR"/>
           </a:p>
@@ -1086,6 +1096,7 @@
           <a:p>
             <a:fld id="{BEFB0128-7FEF-4DF6-B73E-960936029295}" type="slidenum">
               <a:rPr lang="fr-FR" smtClean="0"/>
+              <a:pPr/>
               <a:t>‹N°›</a:t>
             </a:fld>
             <a:endParaRPr lang="fr-FR"/>
@@ -1327,7 +1338,8 @@
           <a:p>
             <a:fld id="{1D335D60-1EC8-4A7B-BBFF-EAF7C09BAE92}" type="datetimeFigureOut">
               <a:rPr lang="fr-FR" smtClean="0"/>
-              <a:t>18/08/2022</a:t>
+              <a:pPr/>
+              <a:t>19/08/2022</a:t>
             </a:fld>
             <a:endParaRPr lang="fr-FR"/>
           </a:p>
@@ -1369,6 +1381,7 @@
           <a:p>
             <a:fld id="{BEFB0128-7FEF-4DF6-B73E-960936029295}" type="slidenum">
               <a:rPr lang="fr-FR" smtClean="0"/>
+              <a:pPr/>
               <a:t>‹N°›</a:t>
             </a:fld>
             <a:endParaRPr lang="fr-FR"/>
@@ -1744,7 +1757,8 @@
           <a:p>
             <a:fld id="{1D335D60-1EC8-4A7B-BBFF-EAF7C09BAE92}" type="datetimeFigureOut">
               <a:rPr lang="fr-FR" smtClean="0"/>
-              <a:t>18/08/2022</a:t>
+              <a:pPr/>
+              <a:t>19/08/2022</a:t>
             </a:fld>
             <a:endParaRPr lang="fr-FR"/>
           </a:p>
@@ -1786,6 +1800,7 @@
           <a:p>
             <a:fld id="{BEFB0128-7FEF-4DF6-B73E-960936029295}" type="slidenum">
               <a:rPr lang="fr-FR" smtClean="0"/>
+              <a:pPr/>
               <a:t>‹N°›</a:t>
             </a:fld>
             <a:endParaRPr lang="fr-FR"/>
@@ -1857,7 +1872,8 @@
           <a:p>
             <a:fld id="{1D335D60-1EC8-4A7B-BBFF-EAF7C09BAE92}" type="datetimeFigureOut">
               <a:rPr lang="fr-FR" smtClean="0"/>
-              <a:t>18/08/2022</a:t>
+              <a:pPr/>
+              <a:t>19/08/2022</a:t>
             </a:fld>
             <a:endParaRPr lang="fr-FR"/>
           </a:p>
@@ -1899,6 +1915,7 @@
           <a:p>
             <a:fld id="{BEFB0128-7FEF-4DF6-B73E-960936029295}" type="slidenum">
               <a:rPr lang="fr-FR" smtClean="0"/>
+              <a:pPr/>
               <a:t>‹N°›</a:t>
             </a:fld>
             <a:endParaRPr lang="fr-FR"/>
@@ -1947,7 +1964,8 @@
           <a:p>
             <a:fld id="{1D335D60-1EC8-4A7B-BBFF-EAF7C09BAE92}" type="datetimeFigureOut">
               <a:rPr lang="fr-FR" smtClean="0"/>
-              <a:t>18/08/2022</a:t>
+              <a:pPr/>
+              <a:t>19/08/2022</a:t>
             </a:fld>
             <a:endParaRPr lang="fr-FR"/>
           </a:p>
@@ -1989,6 +2007,7 @@
           <a:p>
             <a:fld id="{BEFB0128-7FEF-4DF6-B73E-960936029295}" type="slidenum">
               <a:rPr lang="fr-FR" smtClean="0"/>
+              <a:pPr/>
               <a:t>‹N°›</a:t>
             </a:fld>
             <a:endParaRPr lang="fr-FR"/>
@@ -2219,7 +2238,8 @@
           <a:p>
             <a:fld id="{1D335D60-1EC8-4A7B-BBFF-EAF7C09BAE92}" type="datetimeFigureOut">
               <a:rPr lang="fr-FR" smtClean="0"/>
-              <a:t>18/08/2022</a:t>
+              <a:pPr/>
+              <a:t>19/08/2022</a:t>
             </a:fld>
             <a:endParaRPr lang="fr-FR"/>
           </a:p>
@@ -2261,6 +2281,7 @@
           <a:p>
             <a:fld id="{BEFB0128-7FEF-4DF6-B73E-960936029295}" type="slidenum">
               <a:rPr lang="fr-FR" smtClean="0"/>
+              <a:pPr/>
               <a:t>‹N°›</a:t>
             </a:fld>
             <a:endParaRPr lang="fr-FR"/>
@@ -2467,7 +2488,8 @@
           <a:p>
             <a:fld id="{1D335D60-1EC8-4A7B-BBFF-EAF7C09BAE92}" type="datetimeFigureOut">
               <a:rPr lang="fr-FR" smtClean="0"/>
-              <a:t>18/08/2022</a:t>
+              <a:pPr/>
+              <a:t>19/08/2022</a:t>
             </a:fld>
             <a:endParaRPr lang="fr-FR"/>
           </a:p>
@@ -2509,6 +2531,7 @@
           <a:p>
             <a:fld id="{BEFB0128-7FEF-4DF6-B73E-960936029295}" type="slidenum">
               <a:rPr lang="fr-FR" smtClean="0"/>
+              <a:pPr/>
               <a:t>‹N°›</a:t>
             </a:fld>
             <a:endParaRPr lang="fr-FR"/>
@@ -2675,7 +2698,8 @@
           <a:p>
             <a:fld id="{1D335D60-1EC8-4A7B-BBFF-EAF7C09BAE92}" type="datetimeFigureOut">
               <a:rPr lang="fr-FR" smtClean="0"/>
-              <a:t>18/08/2022</a:t>
+              <a:pPr/>
+              <a:t>19/08/2022</a:t>
             </a:fld>
             <a:endParaRPr lang="fr-FR"/>
           </a:p>
@@ -2753,6 +2777,7 @@
           <a:p>
             <a:fld id="{BEFB0128-7FEF-4DF6-B73E-960936029295}" type="slidenum">
               <a:rPr lang="fr-FR" smtClean="0"/>
+              <a:pPr/>
               <a:t>‹N°›</a:t>
             </a:fld>
             <a:endParaRPr lang="fr-FR"/>
@@ -3158,8 +3183,12 @@
           <a:lstStyle/>
           <a:p>
             <a:r>
-              <a:rPr lang="fr-FR" dirty="0" err="1" smtClean="0"/>
-              <a:t>Layout</a:t>
+              <a:rPr lang="fr-FR" dirty="0" smtClean="0"/>
+              <a:t>The </a:t>
+            </a:r>
+            <a:r>
+              <a:rPr lang="fr-FR" dirty="0" err="1" smtClean="0"/>
+              <a:t>removeEventListener</a:t>
             </a:r>
             <a:endParaRPr lang="fr-FR" dirty="0"/>
           </a:p>
@@ -3181,99 +3210,121 @@
           <a:lstStyle/>
           <a:p>
             <a:r>
-              <a:rPr lang="fr-FR" dirty="0" smtClean="0"/>
-              <a:t>HTML document:</a:t>
-            </a:r>
-          </a:p>
-          <a:p>
-            <a:r>
-              <a:rPr lang="fr-FR" dirty="0" err="1" smtClean="0"/>
-              <a:t>head</a:t>
-            </a:r>
-            <a:endParaRPr lang="fr-FR" dirty="0" smtClean="0"/>
-          </a:p>
-          <a:p>
-            <a:pPr lvl="1"/>
-            <a:r>
-              <a:rPr lang="fr-FR" dirty="0" smtClean="0"/>
-              <a:t>script</a:t>
-            </a:r>
-          </a:p>
-          <a:p>
-            <a:r>
-              <a:rPr lang="fr-FR" dirty="0"/>
-              <a:t>b</a:t>
-            </a:r>
-            <a:r>
-              <a:rPr lang="fr-FR" dirty="0" smtClean="0"/>
-              <a:t>ody</a:t>
-            </a:r>
-          </a:p>
-          <a:p>
-            <a:pPr lvl="1"/>
-            <a:r>
-              <a:rPr lang="fr-FR" dirty="0" err="1" smtClean="0"/>
-              <a:t>div</a:t>
-            </a:r>
-            <a:r>
-              <a:rPr lang="fr-FR" dirty="0" smtClean="0"/>
-              <a:t> ‘.</a:t>
-            </a:r>
-            <a:r>
-              <a:rPr lang="fr-FR" dirty="0" err="1" smtClean="0"/>
-              <a:t>grid</a:t>
-            </a:r>
-            <a:r>
-              <a:rPr lang="fr-FR" dirty="0" smtClean="0"/>
-              <a:t>-container’</a:t>
-            </a:r>
-          </a:p>
-          <a:p>
-            <a:pPr lvl="2"/>
-            <a:r>
-              <a:rPr lang="fr-FR" dirty="0" err="1"/>
-              <a:t>d</a:t>
-            </a:r>
-            <a:r>
-              <a:rPr lang="fr-FR" dirty="0" err="1" smtClean="0"/>
-              <a:t>iv</a:t>
-            </a:r>
-            <a:r>
-              <a:rPr lang="fr-FR" dirty="0" smtClean="0"/>
-              <a:t>  ‘.</a:t>
-            </a:r>
-            <a:r>
-              <a:rPr lang="fr-FR" dirty="0" err="1" smtClean="0"/>
-              <a:t>grid</a:t>
-            </a:r>
-            <a:r>
-              <a:rPr lang="fr-FR" dirty="0" smtClean="0"/>
-              <a:t>-item’</a:t>
-            </a:r>
-          </a:p>
-          <a:p>
-            <a:pPr lvl="3"/>
-            <a:r>
-              <a:rPr lang="fr-FR" dirty="0" err="1" smtClean="0"/>
-              <a:t>Img</a:t>
-            </a:r>
-            <a:r>
-              <a:rPr lang="fr-FR" dirty="0" smtClean="0"/>
-              <a:t> ‘#</a:t>
-            </a:r>
-            <a:r>
-              <a:rPr lang="fr-FR" dirty="0" err="1" smtClean="0"/>
-              <a:t>img’N</a:t>
-            </a:r>
-            <a:r>
-              <a:rPr lang="fr-FR" dirty="0" smtClean="0"/>
-              <a:t>  ‘.image-item’</a:t>
-            </a:r>
-          </a:p>
-          <a:p>
-            <a:pPr lvl="1">
-              <a:buNone/>
-            </a:pPr>
+              <a:rPr lang="fr-FR" dirty="0" err="1" smtClean="0"/>
+              <a:t>It’s</a:t>
+            </a:r>
+            <a:r>
+              <a:rPr lang="fr-FR" dirty="0" smtClean="0"/>
+              <a:t> a </a:t>
+            </a:r>
+            <a:r>
+              <a:rPr lang="fr-FR" dirty="0" err="1" smtClean="0"/>
+              <a:t>method</a:t>
+            </a:r>
+            <a:r>
+              <a:rPr lang="fr-FR" dirty="0" smtClean="0"/>
+              <a:t> </a:t>
+            </a:r>
+            <a:r>
+              <a:rPr lang="fr-FR" dirty="0" err="1" smtClean="0"/>
+              <a:t>that</a:t>
+            </a:r>
+            <a:r>
+              <a:rPr lang="fr-FR" dirty="0" smtClean="0"/>
+              <a:t> </a:t>
+            </a:r>
+            <a:r>
+              <a:rPr lang="fr-FR" dirty="0" err="1" smtClean="0"/>
+              <a:t>removes</a:t>
+            </a:r>
+            <a:r>
+              <a:rPr lang="fr-FR" dirty="0" smtClean="0"/>
+              <a:t> </a:t>
+            </a:r>
+            <a:r>
+              <a:rPr lang="fr-FR" dirty="0" err="1" smtClean="0"/>
+              <a:t>event</a:t>
+            </a:r>
+            <a:r>
+              <a:rPr lang="fr-FR" dirty="0" smtClean="0"/>
+              <a:t> </a:t>
+            </a:r>
+            <a:r>
+              <a:rPr lang="fr-FR" dirty="0" err="1" smtClean="0"/>
+              <a:t>handlers</a:t>
+            </a:r>
+            <a:r>
+              <a:rPr lang="fr-FR" dirty="0" smtClean="0"/>
+              <a:t> </a:t>
+            </a:r>
+            <a:r>
+              <a:rPr lang="fr-FR" dirty="0" err="1" smtClean="0"/>
+              <a:t>that</a:t>
+            </a:r>
+            <a:r>
+              <a:rPr lang="fr-FR" dirty="0" smtClean="0"/>
+              <a:t> have been </a:t>
+            </a:r>
+            <a:r>
+              <a:rPr lang="fr-FR" dirty="0" err="1" smtClean="0"/>
+              <a:t>attached</a:t>
+            </a:r>
+            <a:r>
+              <a:rPr lang="fr-FR" dirty="0" smtClean="0"/>
+              <a:t> </a:t>
+            </a:r>
+            <a:r>
+              <a:rPr lang="fr-FR" dirty="0" err="1" smtClean="0"/>
+              <a:t>with</a:t>
+            </a:r>
+            <a:r>
+              <a:rPr lang="fr-FR" dirty="0" smtClean="0"/>
+              <a:t> the </a:t>
+            </a:r>
+            <a:r>
+              <a:rPr lang="fr-FR" dirty="0" err="1" smtClean="0"/>
+              <a:t>addEventListener</a:t>
+            </a:r>
+            <a:r>
+              <a:rPr lang="fr-FR" dirty="0" smtClean="0"/>
+              <a:t> </a:t>
+            </a:r>
+            <a:r>
+              <a:rPr lang="fr-FR" dirty="0" err="1" smtClean="0"/>
+              <a:t>method</a:t>
+            </a:r>
+            <a:r>
+              <a:rPr lang="fr-FR" dirty="0" smtClean="0"/>
+              <a:t>.</a:t>
+            </a:r>
+          </a:p>
+          <a:p>
+            <a:r>
+              <a:rPr lang="fr-FR" dirty="0" err="1" smtClean="0"/>
+              <a:t>Exp</a:t>
+            </a:r>
+            <a:r>
+              <a:rPr lang="fr-FR" dirty="0" smtClean="0"/>
+              <a:t>:</a:t>
+            </a:r>
+          </a:p>
+          <a:p>
+            <a:r>
+              <a:rPr lang="fr-FR" dirty="0" err="1" smtClean="0"/>
+              <a:t>Element.removeEventListener</a:t>
+            </a:r>
+            <a:r>
+              <a:rPr lang="fr-FR" dirty="0" smtClean="0"/>
+              <a:t>(‘click’,</a:t>
+            </a:r>
+            <a:r>
+              <a:rPr lang="fr-FR" dirty="0" err="1" smtClean="0"/>
+              <a:t>myFunction</a:t>
+            </a:r>
+            <a:r>
+              <a:rPr lang="fr-FR" dirty="0" smtClean="0"/>
+              <a:t>);</a:t>
+            </a:r>
             <a:endParaRPr lang="fr-FR" dirty="0"/>
           </a:p>
         </p:txBody>
@@ -3320,6 +3371,167 @@
           <a:p>
             <a:r>
               <a:rPr lang="fr-FR" dirty="0" err="1" smtClean="0"/>
+              <a:t>Layout</a:t>
+            </a:r>
+            <a:endParaRPr lang="fr-FR" dirty="0"/>
+          </a:p>
+        </p:txBody>
+      </p:sp>
+      <p:sp>
+        <p:nvSpPr>
+          <p:cNvPr id="3" name="Espace réservé du contenu 2"/>
+          <p:cNvSpPr>
+            <a:spLocks noGrp="1"/>
+          </p:cNvSpPr>
+          <p:nvPr>
+            <p:ph idx="1"/>
+          </p:nvPr>
+        </p:nvSpPr>
+        <p:spPr/>
+        <p:txBody>
+          <a:bodyPr/>
+          <a:lstStyle/>
+          <a:p>
+            <a:r>
+              <a:rPr lang="fr-FR" dirty="0" smtClean="0"/>
+              <a:t>HTML document:</a:t>
+            </a:r>
+          </a:p>
+          <a:p>
+            <a:r>
+              <a:rPr lang="fr-FR" dirty="0" err="1" smtClean="0"/>
+              <a:t>head</a:t>
+            </a:r>
+            <a:endParaRPr lang="fr-FR" dirty="0" smtClean="0"/>
+          </a:p>
+          <a:p>
+            <a:pPr lvl="1"/>
+            <a:r>
+              <a:rPr lang="fr-FR" dirty="0" smtClean="0"/>
+              <a:t>script</a:t>
+            </a:r>
+          </a:p>
+          <a:p>
+            <a:r>
+              <a:rPr lang="fr-FR" dirty="0"/>
+              <a:t>b</a:t>
+            </a:r>
+            <a:r>
+              <a:rPr lang="fr-FR" dirty="0" smtClean="0"/>
+              <a:t>ody</a:t>
+            </a:r>
+          </a:p>
+          <a:p>
+            <a:pPr lvl="1"/>
+            <a:r>
+              <a:rPr lang="fr-FR" dirty="0" err="1" smtClean="0"/>
+              <a:t>div</a:t>
+            </a:r>
+            <a:r>
+              <a:rPr lang="fr-FR" dirty="0" smtClean="0"/>
+              <a:t> ‘.</a:t>
+            </a:r>
+            <a:r>
+              <a:rPr lang="fr-FR" dirty="0" err="1" smtClean="0"/>
+              <a:t>grid</a:t>
+            </a:r>
+            <a:r>
+              <a:rPr lang="fr-FR" dirty="0" smtClean="0"/>
+              <a:t>-container’</a:t>
+            </a:r>
+          </a:p>
+          <a:p>
+            <a:pPr lvl="2"/>
+            <a:r>
+              <a:rPr lang="fr-FR" dirty="0" err="1"/>
+              <a:t>d</a:t>
+            </a:r>
+            <a:r>
+              <a:rPr lang="fr-FR" dirty="0" err="1" smtClean="0"/>
+              <a:t>iv</a:t>
+            </a:r>
+            <a:r>
+              <a:rPr lang="fr-FR" dirty="0" smtClean="0"/>
+              <a:t>  ‘.</a:t>
+            </a:r>
+            <a:r>
+              <a:rPr lang="fr-FR" dirty="0" err="1" smtClean="0"/>
+              <a:t>grid</a:t>
+            </a:r>
+            <a:r>
+              <a:rPr lang="fr-FR" dirty="0" smtClean="0"/>
+              <a:t>-item’</a:t>
+            </a:r>
+          </a:p>
+          <a:p>
+            <a:pPr lvl="3"/>
+            <a:r>
+              <a:rPr lang="fr-FR" dirty="0" err="1" smtClean="0"/>
+              <a:t>Img</a:t>
+            </a:r>
+            <a:r>
+              <a:rPr lang="fr-FR" dirty="0" smtClean="0"/>
+              <a:t> ‘#</a:t>
+            </a:r>
+            <a:r>
+              <a:rPr lang="fr-FR" dirty="0" err="1" smtClean="0"/>
+              <a:t>img’N</a:t>
+            </a:r>
+            <a:r>
+              <a:rPr lang="fr-FR" dirty="0" smtClean="0"/>
+              <a:t>  ‘.image-item’</a:t>
+            </a:r>
+          </a:p>
+          <a:p>
+            <a:pPr lvl="1">
+              <a:buNone/>
+            </a:pPr>
+            <a:endParaRPr lang="fr-FR" dirty="0"/>
+          </a:p>
+        </p:txBody>
+      </p:sp>
+    </p:spTree>
+  </p:cSld>
+  <p:clrMapOvr>
+    <a:masterClrMapping/>
+  </p:clrMapOvr>
+</p:sld>
+</file>
+
+<file path=ppt/slides/slide12.xml><?xml version="1.0" encoding="utf-8"?>
+<p:sld xmlns:a="http://schemas.openxmlformats.org/drawingml/2006/main" xmlns:r="http://schemas.openxmlformats.org/officeDocument/2006/relationships" xmlns:p="http://schemas.openxmlformats.org/presentationml/2006/main">
+  <p:cSld>
+    <p:spTree>
+      <p:nvGrpSpPr>
+        <p:cNvPr id="1" name=""/>
+        <p:cNvGrpSpPr/>
+        <p:nvPr/>
+      </p:nvGrpSpPr>
+      <p:grpSpPr>
+        <a:xfrm>
+          <a:off x="0" y="0"/>
+          <a:ext cx="0" cy="0"/>
+          <a:chOff x="0" y="0"/>
+          <a:chExt cx="0" cy="0"/>
+        </a:xfrm>
+      </p:grpSpPr>
+      <p:sp>
+        <p:nvSpPr>
+          <p:cNvPr id="2" name="Titre 1"/>
+          <p:cNvSpPr>
+            <a:spLocks noGrp="1"/>
+          </p:cNvSpPr>
+          <p:nvPr>
+            <p:ph type="title"/>
+          </p:nvPr>
+        </p:nvSpPr>
+        <p:spPr/>
+        <p:txBody>
+          <a:bodyPr/>
+          <a:lstStyle/>
+          <a:p>
+            <a:r>
+              <a:rPr lang="fr-FR" dirty="0" err="1" smtClean="0"/>
               <a:t>Fonctionnality</a:t>
             </a:r>
             <a:endParaRPr lang="fr-FR" dirty="0"/>
@@ -3702,54 +3914,16 @@
         </p:nvSpPr>
         <p:spPr/>
         <p:txBody>
-          <a:bodyPr>
-            <a:normAutofit fontScale="90000"/>
-          </a:bodyPr>
-          <a:lstStyle/>
-          <a:p>
-            <a:r>
-              <a:rPr lang="fr-FR" dirty="0" err="1" smtClean="0"/>
-              <a:t>What’s</a:t>
-            </a:r>
-            <a:r>
-              <a:rPr lang="fr-FR" dirty="0" smtClean="0"/>
-              <a:t> the </a:t>
-            </a:r>
-            <a:r>
-              <a:rPr lang="fr-FR" dirty="0" err="1" smtClean="0"/>
-              <a:t>difference</a:t>
-            </a:r>
-            <a:r>
-              <a:rPr lang="fr-FR" dirty="0" smtClean="0"/>
-              <a:t> </a:t>
-            </a:r>
-            <a:r>
-              <a:rPr lang="fr-FR" dirty="0" err="1" smtClean="0"/>
-              <a:t>between</a:t>
-            </a:r>
-            <a:r>
-              <a:rPr lang="fr-FR" dirty="0" smtClean="0"/>
-              <a:t> </a:t>
-            </a:r>
-            <a:r>
-              <a:rPr lang="fr-FR" dirty="0" err="1"/>
-              <a:t>o</a:t>
-            </a:r>
-            <a:r>
-              <a:rPr lang="fr-FR" dirty="0" err="1" smtClean="0"/>
-              <a:t>nclick</a:t>
-            </a:r>
-            <a:r>
-              <a:rPr lang="fr-FR" dirty="0" smtClean="0"/>
-              <a:t> and </a:t>
-            </a:r>
-            <a:r>
-              <a:rPr lang="fr-FR" dirty="0" err="1" smtClean="0"/>
-              <a:t>addEventListener</a:t>
-            </a:r>
-            <a:r>
-              <a:rPr lang="fr-FR" dirty="0" smtClean="0"/>
-              <a:t>?</a:t>
+          <a:bodyPr/>
+          <a:lstStyle/>
+          <a:p>
+            <a:r>
+              <a:rPr lang="fr-FR" dirty="0" smtClean="0"/>
+              <a:t>Game </a:t>
+            </a:r>
+            <a:r>
+              <a:rPr lang="fr-FR" dirty="0" err="1" smtClean="0"/>
+              <a:t>Rules</a:t>
             </a:r>
             <a:endParaRPr lang="fr-FR" dirty="0"/>
           </a:p>
@@ -3772,102 +3946,53 @@
           <a:p>
             <a:r>
               <a:rPr lang="fr-FR" dirty="0" err="1" smtClean="0"/>
-              <a:t>Both</a:t>
-            </a:r>
-            <a:r>
-              <a:rPr lang="fr-FR" dirty="0" smtClean="0"/>
-              <a:t> </a:t>
-            </a:r>
-            <a:r>
-              <a:rPr lang="fr-FR" dirty="0" err="1" smtClean="0"/>
-              <a:t>listen</a:t>
-            </a:r>
-            <a:r>
-              <a:rPr lang="fr-FR" dirty="0" smtClean="0"/>
-              <a:t> for an </a:t>
-            </a:r>
-            <a:r>
-              <a:rPr lang="fr-FR" dirty="0" err="1" smtClean="0"/>
-              <a:t>event</a:t>
-            </a:r>
-            <a:endParaRPr lang="fr-FR" dirty="0" smtClean="0"/>
-          </a:p>
-          <a:p>
-            <a:r>
-              <a:rPr lang="fr-FR" dirty="0" err="1" smtClean="0"/>
-              <a:t>Both</a:t>
-            </a:r>
-            <a:r>
-              <a:rPr lang="fr-FR" dirty="0" smtClean="0"/>
-              <a:t> </a:t>
-            </a:r>
-            <a:r>
-              <a:rPr lang="fr-FR" dirty="0" err="1" smtClean="0"/>
-              <a:t>can</a:t>
-            </a:r>
-            <a:r>
-              <a:rPr lang="fr-FR" dirty="0" smtClean="0"/>
-              <a:t> </a:t>
-            </a:r>
-            <a:r>
-              <a:rPr lang="fr-FR" dirty="0" err="1" smtClean="0"/>
-              <a:t>execute</a:t>
-            </a:r>
-            <a:r>
-              <a:rPr lang="fr-FR" dirty="0" smtClean="0"/>
-              <a:t> a callback </a:t>
-            </a:r>
-            <a:r>
-              <a:rPr lang="fr-FR" dirty="0" err="1" smtClean="0"/>
-              <a:t>function</a:t>
-            </a:r>
-            <a:r>
-              <a:rPr lang="fr-FR" dirty="0" smtClean="0"/>
-              <a:t> </a:t>
-            </a:r>
-            <a:r>
-              <a:rPr lang="fr-FR" dirty="0" err="1" smtClean="0"/>
-              <a:t>when</a:t>
-            </a:r>
-            <a:r>
-              <a:rPr lang="fr-FR" dirty="0" smtClean="0"/>
-              <a:t> an </a:t>
-            </a:r>
-            <a:r>
-              <a:rPr lang="fr-FR" dirty="0" err="1" smtClean="0"/>
-              <a:t>element</a:t>
-            </a:r>
-            <a:r>
-              <a:rPr lang="fr-FR" dirty="0" smtClean="0"/>
-              <a:t> -a </a:t>
-            </a:r>
-            <a:r>
-              <a:rPr lang="fr-FR" dirty="0" err="1" smtClean="0"/>
-              <a:t>button</a:t>
-            </a:r>
-            <a:r>
-              <a:rPr lang="fr-FR" dirty="0" smtClean="0"/>
-              <a:t> </a:t>
-            </a:r>
-            <a:r>
-              <a:rPr lang="fr-FR" dirty="0" err="1" smtClean="0"/>
-              <a:t>usually</a:t>
-            </a:r>
-            <a:r>
-              <a:rPr lang="fr-FR" dirty="0"/>
-              <a:t>-</a:t>
-            </a:r>
-            <a:r>
-              <a:rPr lang="fr-FR" dirty="0" smtClean="0"/>
-              <a:t> an image in </a:t>
-            </a:r>
-            <a:r>
-              <a:rPr lang="fr-FR" dirty="0" err="1" smtClean="0"/>
-              <a:t>our</a:t>
-            </a:r>
-            <a:r>
-              <a:rPr lang="fr-FR" dirty="0" smtClean="0"/>
-              <a:t> case </a:t>
+              <a:t>Guessing</a:t>
+            </a:r>
+            <a:r>
+              <a:rPr lang="fr-FR" dirty="0" smtClean="0"/>
+              <a:t> </a:t>
+            </a:r>
+            <a:r>
+              <a:rPr lang="en-US" dirty="0" smtClean="0"/>
+              <a:t>the similar </a:t>
+            </a:r>
+            <a:r>
+              <a:rPr lang="en-US" dirty="0" smtClean="0"/>
+              <a:t>images in a </a:t>
+            </a:r>
+            <a:r>
+              <a:rPr lang="en-US" dirty="0" smtClean="0"/>
+              <a:t>grid by clicking-on twice. Each on a grid item or grid cellular </a:t>
+            </a:r>
+            <a:r>
+              <a:rPr lang="en-US" dirty="0" err="1" smtClean="0"/>
+              <a:t>wich</a:t>
+            </a:r>
+            <a:r>
+              <a:rPr lang="en-US" dirty="0" smtClean="0"/>
+              <a:t> contains the </a:t>
+            </a:r>
+            <a:r>
+              <a:rPr lang="en-US" dirty="0" err="1" smtClean="0"/>
+              <a:t>choosed</a:t>
+            </a:r>
+            <a:r>
+              <a:rPr lang="en-US" dirty="0" smtClean="0"/>
+              <a:t> image.</a:t>
+            </a:r>
+          </a:p>
+          <a:p>
+            <a:r>
+              <a:rPr lang="fr-FR" dirty="0" smtClean="0"/>
+              <a:t>The </a:t>
+            </a:r>
+            <a:r>
+              <a:rPr lang="fr-FR" dirty="0" err="1" smtClean="0"/>
+              <a:t>grid</a:t>
+            </a:r>
+            <a:r>
+              <a:rPr lang="fr-FR" dirty="0" smtClean="0"/>
+              <a:t> </a:t>
             </a:r>
             <a:r>
               <a:rPr lang="fr-FR" dirty="0" err="1" smtClean="0"/>
@@ -3879,123 +4004,59 @@
             </a:r>
             <a:r>
               <a:rPr lang="fr-FR" dirty="0" err="1" smtClean="0"/>
-              <a:t>clicked</a:t>
-            </a:r>
-            <a:r>
-              <a:rPr lang="fr-FR" dirty="0" smtClean="0"/>
-              <a:t>.</a:t>
-            </a:r>
-          </a:p>
-          <a:p>
-            <a:r>
-              <a:rPr lang="fr-FR" dirty="0" err="1"/>
-              <a:t>o</a:t>
-            </a:r>
-            <a:r>
-              <a:rPr lang="fr-FR" dirty="0" err="1" smtClean="0"/>
-              <a:t>nclick</a:t>
-            </a:r>
-            <a:r>
-              <a:rPr lang="fr-FR" dirty="0" smtClean="0"/>
-              <a:t> </a:t>
-            </a:r>
-            <a:r>
-              <a:rPr lang="fr-FR" dirty="0" err="1" smtClean="0"/>
-              <a:t>can</a:t>
-            </a:r>
-            <a:r>
-              <a:rPr lang="fr-FR" dirty="0" smtClean="0"/>
-              <a:t> </a:t>
-            </a:r>
-            <a:r>
-              <a:rPr lang="fr-FR" dirty="0" err="1" smtClean="0"/>
-              <a:t>only</a:t>
-            </a:r>
-            <a:r>
-              <a:rPr lang="fr-FR" dirty="0" smtClean="0"/>
-              <a:t> </a:t>
-            </a:r>
-            <a:r>
-              <a:rPr lang="fr-FR" dirty="0" err="1" smtClean="0"/>
-              <a:t>add</a:t>
-            </a:r>
-            <a:r>
-              <a:rPr lang="fr-FR" dirty="0" smtClean="0"/>
-              <a:t> a single </a:t>
-            </a:r>
-            <a:r>
-              <a:rPr lang="fr-FR" dirty="0" err="1" smtClean="0"/>
-              <a:t>event</a:t>
-            </a:r>
-            <a:r>
-              <a:rPr lang="fr-FR" dirty="0" smtClean="0"/>
-              <a:t> to an </a:t>
-            </a:r>
-            <a:r>
-              <a:rPr lang="fr-FR" dirty="0" err="1" smtClean="0"/>
-              <a:t>element</a:t>
-            </a:r>
-            <a:r>
-              <a:rPr lang="fr-FR" dirty="0" smtClean="0"/>
-              <a:t>.</a:t>
-            </a:r>
-          </a:p>
-          <a:p>
-            <a:r>
-              <a:rPr lang="fr-FR" dirty="0" err="1" smtClean="0"/>
-              <a:t>addEventListener</a:t>
-            </a:r>
-            <a:r>
-              <a:rPr lang="fr-FR" dirty="0" smtClean="0"/>
-              <a:t> </a:t>
-            </a:r>
-            <a:r>
-              <a:rPr lang="fr-FR" dirty="0" err="1" smtClean="0"/>
-              <a:t>can</a:t>
-            </a:r>
-            <a:r>
-              <a:rPr lang="fr-FR" dirty="0" smtClean="0"/>
-              <a:t> </a:t>
-            </a:r>
-            <a:r>
-              <a:rPr lang="fr-FR" dirty="0" err="1" smtClean="0"/>
-              <a:t>add</a:t>
-            </a:r>
-            <a:r>
-              <a:rPr lang="fr-FR" dirty="0" smtClean="0"/>
-              <a:t> </a:t>
-            </a:r>
-            <a:r>
-              <a:rPr lang="fr-FR" dirty="0" err="1" smtClean="0"/>
-              <a:t>miltiple</a:t>
-            </a:r>
-            <a:r>
-              <a:rPr lang="fr-FR" dirty="0" smtClean="0"/>
-              <a:t> </a:t>
-            </a:r>
-            <a:r>
-              <a:rPr lang="fr-FR" dirty="0" err="1" smtClean="0"/>
-              <a:t>events</a:t>
-            </a:r>
-            <a:r>
-              <a:rPr lang="fr-FR" dirty="0" smtClean="0"/>
-              <a:t> to a </a:t>
-            </a:r>
-            <a:r>
-              <a:rPr lang="fr-FR" dirty="0" err="1" smtClean="0"/>
-              <a:t>particular</a:t>
-            </a:r>
-            <a:r>
-              <a:rPr lang="fr-FR" dirty="0" smtClean="0"/>
-              <a:t> </a:t>
-            </a:r>
-            <a:r>
-              <a:rPr lang="fr-FR" dirty="0" err="1" smtClean="0"/>
-              <a:t>element</a:t>
-            </a:r>
-            <a:r>
-              <a:rPr lang="fr-FR" dirty="0" smtClean="0"/>
-              <a:t>. </a:t>
+              <a:t>consisted</a:t>
+            </a:r>
+            <a:r>
+              <a:rPr lang="fr-FR" dirty="0" smtClean="0"/>
+              <a:t> of 4 </a:t>
+            </a:r>
+            <a:r>
+              <a:rPr lang="fr-FR" dirty="0" err="1" smtClean="0"/>
+              <a:t>rows</a:t>
+            </a:r>
+            <a:r>
+              <a:rPr lang="fr-FR" dirty="0" smtClean="0"/>
+              <a:t> and 4 </a:t>
+            </a:r>
+            <a:r>
+              <a:rPr lang="fr-FR" dirty="0" err="1" smtClean="0"/>
+              <a:t>colums</a:t>
+            </a:r>
+            <a:r>
+              <a:rPr lang="fr-FR" dirty="0" smtClean="0"/>
+              <a:t> </a:t>
+            </a:r>
+            <a:r>
+              <a:rPr lang="fr-FR" dirty="0" err="1" smtClean="0"/>
+              <a:t>wich</a:t>
+            </a:r>
+            <a:r>
+              <a:rPr lang="fr-FR" dirty="0" smtClean="0"/>
+              <a:t> </a:t>
+            </a:r>
+            <a:r>
+              <a:rPr lang="fr-FR" dirty="0" err="1" smtClean="0"/>
+              <a:t>get</a:t>
+            </a:r>
+            <a:r>
+              <a:rPr lang="fr-FR" dirty="0" smtClean="0"/>
+              <a:t> 16 </a:t>
+            </a:r>
+            <a:r>
+              <a:rPr lang="fr-FR" dirty="0" err="1" smtClean="0"/>
+              <a:t>grid</a:t>
+            </a:r>
+            <a:r>
+              <a:rPr lang="fr-FR" dirty="0" smtClean="0"/>
+              <a:t> items </a:t>
+            </a:r>
+            <a:r>
+              <a:rPr lang="fr-FR" dirty="0" err="1" smtClean="0"/>
+              <a:t>then</a:t>
+            </a:r>
+            <a:r>
+              <a:rPr lang="fr-FR" dirty="0" smtClean="0"/>
+              <a:t> 16 images.</a:t>
             </a:r>
             <a:endParaRPr lang="fr-FR" dirty="0"/>
           </a:p>
@@ -4038,343 +4099,74 @@
         </p:nvSpPr>
         <p:spPr/>
         <p:txBody>
+          <a:bodyPr/>
+          <a:lstStyle/>
+          <a:p>
+            <a:endParaRPr lang="fr-FR" dirty="0"/>
+          </a:p>
+        </p:txBody>
+      </p:sp>
+      <p:sp>
+        <p:nvSpPr>
+          <p:cNvPr id="3" name="Espace réservé du contenu 2"/>
+          <p:cNvSpPr>
+            <a:spLocks noGrp="1"/>
+          </p:cNvSpPr>
+          <p:nvPr>
+            <p:ph idx="1"/>
+          </p:nvPr>
+        </p:nvSpPr>
+        <p:spPr/>
+        <p:txBody>
           <a:bodyPr>
-            <a:normAutofit fontScale="90000"/>
+            <a:normAutofit lnSpcReduction="10000"/>
           </a:bodyPr>
           <a:lstStyle/>
           <a:p>
             <a:r>
-              <a:rPr lang="fr-FR" dirty="0" err="1" smtClean="0"/>
-              <a:t>Add</a:t>
-            </a:r>
-            <a:r>
-              <a:rPr lang="fr-FR" dirty="0" smtClean="0"/>
-              <a:t> </a:t>
-            </a:r>
-            <a:r>
-              <a:rPr lang="fr-FR" dirty="0" err="1" smtClean="0"/>
-              <a:t>Many</a:t>
-            </a:r>
-            <a:r>
-              <a:rPr lang="fr-FR" dirty="0" smtClean="0"/>
-              <a:t> Event </a:t>
-            </a:r>
-            <a:r>
-              <a:rPr lang="fr-FR" dirty="0" err="1" smtClean="0"/>
-              <a:t>Handlers</a:t>
-            </a:r>
-            <a:r>
-              <a:rPr lang="fr-FR" dirty="0" smtClean="0"/>
-              <a:t> to the </a:t>
-            </a:r>
-            <a:r>
-              <a:rPr lang="fr-FR" dirty="0" err="1" smtClean="0"/>
-              <a:t>Same</a:t>
-            </a:r>
-            <a:r>
-              <a:rPr lang="fr-FR" dirty="0" smtClean="0"/>
-              <a:t> </a:t>
-            </a:r>
-            <a:r>
-              <a:rPr lang="fr-FR" dirty="0" err="1" smtClean="0"/>
-              <a:t>Element</a:t>
-            </a:r>
-            <a:endParaRPr lang="fr-FR" dirty="0"/>
-          </a:p>
-        </p:txBody>
-      </p:sp>
-      <p:sp>
-        <p:nvSpPr>
-          <p:cNvPr id="3" name="Espace réservé du contenu 2"/>
-          <p:cNvSpPr>
-            <a:spLocks noGrp="1"/>
-          </p:cNvSpPr>
-          <p:nvPr>
-            <p:ph idx="1"/>
-          </p:nvPr>
-        </p:nvSpPr>
-        <p:spPr>
-          <a:xfrm>
-            <a:off x="357158" y="1600200"/>
-            <a:ext cx="8786842" cy="4525963"/>
-          </a:xfrm>
-        </p:spPr>
-        <p:txBody>
-          <a:bodyPr>
-            <a:normAutofit/>
-          </a:bodyPr>
-          <a:lstStyle/>
-          <a:p>
-            <a:r>
-              <a:rPr lang="fr-FR" dirty="0" err="1" smtClean="0"/>
-              <a:t>addEventListener</a:t>
-            </a:r>
-            <a:r>
-              <a:rPr lang="fr-FR" dirty="0" smtClean="0"/>
-              <a:t>() </a:t>
-            </a:r>
-            <a:r>
-              <a:rPr lang="fr-FR" dirty="0" err="1" smtClean="0"/>
-              <a:t>is</a:t>
-            </a:r>
-            <a:r>
-              <a:rPr lang="fr-FR" dirty="0" smtClean="0"/>
-              <a:t> a </a:t>
-            </a:r>
-            <a:r>
-              <a:rPr lang="fr-FR" dirty="0" err="1" smtClean="0"/>
-              <a:t>method</a:t>
-            </a:r>
-            <a:r>
-              <a:rPr lang="fr-FR" dirty="0" smtClean="0"/>
-              <a:t> </a:t>
-            </a:r>
-            <a:r>
-              <a:rPr lang="fr-FR" dirty="0" err="1" smtClean="0"/>
-              <a:t>that’s</a:t>
-            </a:r>
-            <a:r>
-              <a:rPr lang="fr-FR" dirty="0" smtClean="0"/>
-              <a:t> </a:t>
-            </a:r>
-            <a:r>
-              <a:rPr lang="fr-FR" dirty="0" err="1" smtClean="0"/>
-              <a:t>why</a:t>
-            </a:r>
-            <a:r>
-              <a:rPr lang="fr-FR" dirty="0" smtClean="0"/>
-              <a:t> </a:t>
-            </a:r>
-            <a:r>
-              <a:rPr lang="fr-FR" dirty="0" err="1" smtClean="0"/>
-              <a:t>it</a:t>
-            </a:r>
-            <a:r>
-              <a:rPr lang="fr-FR" dirty="0" smtClean="0"/>
-              <a:t> </a:t>
-            </a:r>
-            <a:r>
-              <a:rPr lang="fr-FR" dirty="0" err="1" smtClean="0"/>
-              <a:t>allows</a:t>
-            </a:r>
-            <a:r>
-              <a:rPr lang="fr-FR" dirty="0" smtClean="0"/>
-              <a:t> to </a:t>
-            </a:r>
-            <a:r>
-              <a:rPr lang="fr-FR" dirty="0" err="1" smtClean="0"/>
-              <a:t>add</a:t>
-            </a:r>
-            <a:r>
-              <a:rPr lang="fr-FR" dirty="0" smtClean="0"/>
-              <a:t> </a:t>
-            </a:r>
-            <a:r>
-              <a:rPr lang="fr-FR" dirty="0" err="1" smtClean="0"/>
-              <a:t>many</a:t>
-            </a:r>
-            <a:r>
-              <a:rPr lang="fr-FR" dirty="0" smtClean="0"/>
-              <a:t> </a:t>
-            </a:r>
-            <a:r>
-              <a:rPr lang="fr-FR" dirty="0" err="1" smtClean="0"/>
-              <a:t>events</a:t>
-            </a:r>
-            <a:r>
-              <a:rPr lang="fr-FR" dirty="0" smtClean="0"/>
-              <a:t> to  the </a:t>
-            </a:r>
-            <a:r>
-              <a:rPr lang="fr-FR" dirty="0" err="1" smtClean="0"/>
-              <a:t>same</a:t>
-            </a:r>
-            <a:r>
-              <a:rPr lang="fr-FR" dirty="0" smtClean="0"/>
-              <a:t> </a:t>
-            </a:r>
-            <a:r>
-              <a:rPr lang="fr-FR" dirty="0" err="1" smtClean="0"/>
-              <a:t>element</a:t>
-            </a:r>
-            <a:r>
-              <a:rPr lang="fr-FR" dirty="0"/>
-              <a:t> </a:t>
-            </a:r>
-            <a:r>
-              <a:rPr lang="fr-FR" dirty="0" err="1" smtClean="0"/>
-              <a:t>without</a:t>
-            </a:r>
-            <a:r>
-              <a:rPr lang="fr-FR" dirty="0" smtClean="0"/>
-              <a:t> </a:t>
-            </a:r>
-            <a:r>
-              <a:rPr lang="fr-FR" dirty="0" err="1" smtClean="0"/>
-              <a:t>overwriting</a:t>
-            </a:r>
-            <a:r>
-              <a:rPr lang="fr-FR" dirty="0" smtClean="0"/>
-              <a:t> </a:t>
-            </a:r>
-            <a:r>
-              <a:rPr lang="fr-FR" dirty="0" err="1" smtClean="0"/>
-              <a:t>existing</a:t>
-            </a:r>
-            <a:r>
-              <a:rPr lang="fr-FR" dirty="0" smtClean="0"/>
-              <a:t> </a:t>
-            </a:r>
-            <a:r>
-              <a:rPr lang="fr-FR" dirty="0" err="1" smtClean="0"/>
-              <a:t>events</a:t>
-            </a:r>
-            <a:r>
-              <a:rPr lang="fr-FR" dirty="0" smtClean="0"/>
-              <a:t>.</a:t>
-            </a:r>
-          </a:p>
-          <a:p>
-            <a:r>
-              <a:rPr lang="fr-FR" dirty="0" err="1" smtClean="0"/>
-              <a:t>Onclick</a:t>
-            </a:r>
-            <a:r>
-              <a:rPr lang="fr-FR" dirty="0" smtClean="0"/>
-              <a:t> </a:t>
-            </a:r>
-            <a:r>
-              <a:rPr lang="fr-FR" dirty="0" err="1" smtClean="0"/>
-              <a:t>is</a:t>
-            </a:r>
-            <a:r>
-              <a:rPr lang="fr-FR" dirty="0" smtClean="0"/>
-              <a:t> a </a:t>
-            </a:r>
-            <a:r>
-              <a:rPr lang="fr-FR" dirty="0" err="1" smtClean="0"/>
-              <a:t>proprety</a:t>
-            </a:r>
-            <a:r>
-              <a:rPr lang="fr-FR" dirty="0" smtClean="0"/>
-              <a:t> </a:t>
-            </a:r>
-            <a:r>
-              <a:rPr lang="fr-FR" dirty="0" err="1" smtClean="0"/>
-              <a:t>that’s</a:t>
-            </a:r>
-            <a:r>
-              <a:rPr lang="fr-FR" dirty="0" smtClean="0"/>
-              <a:t> </a:t>
-            </a:r>
-            <a:r>
-              <a:rPr lang="fr-FR" dirty="0" err="1" smtClean="0"/>
-              <a:t>why</a:t>
-            </a:r>
-            <a:r>
-              <a:rPr lang="fr-FR" dirty="0" smtClean="0"/>
-              <a:t> </a:t>
-            </a:r>
-            <a:r>
-              <a:rPr lang="fr-FR" dirty="0" err="1" smtClean="0"/>
-              <a:t>it</a:t>
-            </a:r>
-            <a:r>
-              <a:rPr lang="fr-FR" dirty="0" smtClean="0"/>
-              <a:t> </a:t>
-            </a:r>
-            <a:r>
-              <a:rPr lang="fr-FR" dirty="0" err="1" smtClean="0"/>
-              <a:t>will</a:t>
-            </a:r>
-            <a:r>
-              <a:rPr lang="fr-FR" dirty="0" smtClean="0"/>
-              <a:t> </a:t>
-            </a:r>
-            <a:r>
-              <a:rPr lang="fr-FR" dirty="0" err="1" smtClean="0"/>
-              <a:t>be</a:t>
-            </a:r>
-            <a:r>
-              <a:rPr lang="fr-FR" dirty="0" smtClean="0"/>
-              <a:t> </a:t>
-            </a:r>
-            <a:r>
-              <a:rPr lang="fr-FR" dirty="0" err="1" smtClean="0"/>
-              <a:t>overwrote</a:t>
-            </a:r>
-            <a:r>
-              <a:rPr lang="fr-FR" dirty="0" smtClean="0"/>
-              <a:t> </a:t>
-            </a:r>
-            <a:r>
-              <a:rPr lang="fr-FR" dirty="0" err="1" smtClean="0"/>
-              <a:t>when</a:t>
-            </a:r>
-            <a:r>
-              <a:rPr lang="fr-FR" dirty="0" smtClean="0"/>
-              <a:t> </a:t>
-            </a:r>
-            <a:r>
-              <a:rPr lang="fr-FR" dirty="0" err="1" smtClean="0"/>
-              <a:t>reused</a:t>
-            </a:r>
-            <a:r>
-              <a:rPr lang="fr-FR" dirty="0" smtClean="0"/>
-              <a:t>.</a:t>
-            </a:r>
-          </a:p>
-          <a:p>
-            <a:r>
-              <a:rPr lang="fr-FR" dirty="0" err="1" smtClean="0"/>
-              <a:t>Exp</a:t>
-            </a:r>
-            <a:r>
-              <a:rPr lang="fr-FR" dirty="0" smtClean="0"/>
-              <a:t>:</a:t>
-            </a:r>
-          </a:p>
-          <a:p>
-            <a:r>
-              <a:rPr lang="fr-FR" dirty="0" err="1"/>
-              <a:t>e</a:t>
-            </a:r>
-            <a:r>
-              <a:rPr lang="fr-FR" dirty="0" err="1" smtClean="0"/>
-              <a:t>lement.addEventListener</a:t>
-            </a:r>
-            <a:r>
-              <a:rPr lang="fr-FR" dirty="0" smtClean="0"/>
-              <a:t>(‘click’,</a:t>
-            </a:r>
-            <a:r>
-              <a:rPr lang="fr-FR" dirty="0" err="1" smtClean="0"/>
-              <a:t>myfunction</a:t>
-            </a:r>
-            <a:r>
-              <a:rPr lang="fr-FR" dirty="0" smtClean="0"/>
-              <a:t>)</a:t>
-            </a:r>
-          </a:p>
-          <a:p>
-            <a:r>
-              <a:rPr lang="fr-FR" dirty="0" err="1" smtClean="0"/>
-              <a:t>Element.addEventListener</a:t>
-            </a:r>
-            <a:r>
-              <a:rPr lang="fr-FR" dirty="0" smtClean="0"/>
-              <a:t>(‘click’,</a:t>
-            </a:r>
-            <a:r>
-              <a:rPr lang="fr-FR" dirty="0" err="1" smtClean="0"/>
-              <a:t>mysecfunction</a:t>
-            </a:r>
-            <a:r>
-              <a:rPr lang="fr-FR" dirty="0" smtClean="0"/>
-              <a:t>)</a:t>
-            </a:r>
-          </a:p>
-          <a:p>
+              <a:rPr lang="en-US" dirty="0" smtClean="0"/>
+              <a:t>//how to get clicked images?</a:t>
+            </a:r>
+          </a:p>
+          <a:p>
+            <a:r>
+              <a:rPr lang="en-US" dirty="0" smtClean="0"/>
+              <a:t>//how to add a click event to an image?</a:t>
+            </a:r>
+          </a:p>
+          <a:p>
+            <a:r>
+              <a:rPr lang="en-US" dirty="0" smtClean="0"/>
+              <a:t>//how to get the id of the clicked image?</a:t>
+            </a:r>
+          </a:p>
+          <a:p>
+            <a:r>
+              <a:rPr lang="en-US" dirty="0" smtClean="0"/>
+              <a:t>//how to get the attribute of the clicked image?</a:t>
+            </a:r>
+          </a:p>
+          <a:p>
+            <a:r>
+              <a:rPr lang="en-US" smtClean="0"/>
+              <a:t>What to use?</a:t>
+            </a:r>
+          </a:p>
+          <a:p>
+            <a:r>
+              <a:rPr lang="en-US" dirty="0" smtClean="0"/>
+              <a:t>//</a:t>
+            </a:r>
+            <a:r>
+              <a:rPr lang="en-US" dirty="0" smtClean="0"/>
+              <a:t>display: none;</a:t>
+            </a:r>
+          </a:p>
+          <a:p>
+            <a:r>
+              <a:rPr lang="en-US" dirty="0" smtClean="0"/>
+              <a:t>//visibility: hidden;</a:t>
+            </a:r>
             <a:endParaRPr lang="fr-FR" dirty="0"/>
           </a:p>
         </p:txBody>
@@ -4416,61 +4208,120 @@
         </p:nvSpPr>
         <p:spPr/>
         <p:txBody>
+          <a:bodyPr>
+            <a:normAutofit fontScale="90000"/>
+          </a:bodyPr>
+          <a:lstStyle/>
+          <a:p>
+            <a:r>
+              <a:rPr lang="fr-FR" dirty="0" err="1" smtClean="0"/>
+              <a:t>What’s</a:t>
+            </a:r>
+            <a:r>
+              <a:rPr lang="fr-FR" dirty="0" smtClean="0"/>
+              <a:t> the </a:t>
+            </a:r>
+            <a:r>
+              <a:rPr lang="fr-FR" dirty="0" err="1" smtClean="0"/>
+              <a:t>difference</a:t>
+            </a:r>
+            <a:r>
+              <a:rPr lang="fr-FR" dirty="0" smtClean="0"/>
+              <a:t> </a:t>
+            </a:r>
+            <a:r>
+              <a:rPr lang="fr-FR" dirty="0" err="1" smtClean="0"/>
+              <a:t>between</a:t>
+            </a:r>
+            <a:r>
+              <a:rPr lang="fr-FR" dirty="0" smtClean="0"/>
+              <a:t> </a:t>
+            </a:r>
+            <a:r>
+              <a:rPr lang="fr-FR" dirty="0" err="1"/>
+              <a:t>o</a:t>
+            </a:r>
+            <a:r>
+              <a:rPr lang="fr-FR" dirty="0" err="1" smtClean="0"/>
+              <a:t>nclick</a:t>
+            </a:r>
+            <a:r>
+              <a:rPr lang="fr-FR" dirty="0" smtClean="0"/>
+              <a:t> and </a:t>
+            </a:r>
+            <a:r>
+              <a:rPr lang="fr-FR" dirty="0" err="1" smtClean="0"/>
+              <a:t>addEventListener</a:t>
+            </a:r>
+            <a:r>
+              <a:rPr lang="fr-FR" dirty="0" smtClean="0"/>
+              <a:t>?</a:t>
+            </a:r>
+            <a:endParaRPr lang="fr-FR" dirty="0"/>
+          </a:p>
+        </p:txBody>
+      </p:sp>
+      <p:sp>
+        <p:nvSpPr>
+          <p:cNvPr id="3" name="Espace réservé du contenu 2"/>
+          <p:cNvSpPr>
+            <a:spLocks noGrp="1"/>
+          </p:cNvSpPr>
+          <p:nvPr>
+            <p:ph idx="1"/>
+          </p:nvPr>
+        </p:nvSpPr>
+        <p:spPr/>
+        <p:txBody>
           <a:bodyPr/>
           <a:lstStyle/>
           <a:p>
             <a:r>
-              <a:rPr lang="fr-FR" dirty="0" smtClean="0"/>
-              <a:t>Passing </a:t>
-            </a:r>
-            <a:r>
-              <a:rPr lang="fr-FR" dirty="0" err="1" smtClean="0"/>
-              <a:t>Parameters</a:t>
-            </a:r>
-            <a:endParaRPr lang="fr-FR" dirty="0"/>
-          </a:p>
-        </p:txBody>
-      </p:sp>
-      <p:sp>
-        <p:nvSpPr>
-          <p:cNvPr id="3" name="Espace réservé du contenu 2"/>
-          <p:cNvSpPr>
-            <a:spLocks noGrp="1"/>
-          </p:cNvSpPr>
-          <p:nvPr>
-            <p:ph idx="1"/>
-          </p:nvPr>
-        </p:nvSpPr>
-        <p:spPr/>
-        <p:txBody>
-          <a:bodyPr>
-            <a:normAutofit/>
-          </a:bodyPr>
-          <a:lstStyle/>
-          <a:p>
-            <a:r>
-              <a:rPr lang="fr-FR" dirty="0" err="1" smtClean="0"/>
-              <a:t>When</a:t>
-            </a:r>
-            <a:r>
-              <a:rPr lang="fr-FR" dirty="0" smtClean="0"/>
-              <a:t> passing </a:t>
-            </a:r>
-            <a:r>
-              <a:rPr lang="fr-FR" dirty="0" err="1" smtClean="0"/>
-              <a:t>parameter</a:t>
-            </a:r>
-            <a:r>
-              <a:rPr lang="fr-FR" dirty="0" smtClean="0"/>
-              <a:t> values, use an  ‘</a:t>
-            </a:r>
-            <a:r>
-              <a:rPr lang="fr-FR" dirty="0" err="1" smtClean="0"/>
-              <a:t>anonymous</a:t>
-            </a:r>
-            <a:r>
-              <a:rPr lang="fr-FR" dirty="0" smtClean="0"/>
-              <a:t> </a:t>
+              <a:rPr lang="fr-FR" dirty="0" err="1" smtClean="0"/>
+              <a:t>Both</a:t>
+            </a:r>
+            <a:r>
+              <a:rPr lang="fr-FR" dirty="0" smtClean="0"/>
+              <a:t> </a:t>
+            </a:r>
+            <a:r>
+              <a:rPr lang="fr-FR" dirty="0" err="1" smtClean="0"/>
+              <a:t>listen</a:t>
+            </a:r>
+            <a:r>
+              <a:rPr lang="fr-FR" dirty="0" smtClean="0"/>
+              <a:t> for an </a:t>
+            </a:r>
+            <a:r>
+              <a:rPr lang="fr-FR" dirty="0" err="1" smtClean="0"/>
+              <a:t>event</a:t>
+            </a:r>
+            <a:endParaRPr lang="fr-FR" dirty="0" smtClean="0"/>
+          </a:p>
+          <a:p>
+            <a:r>
+              <a:rPr lang="fr-FR" dirty="0" err="1" smtClean="0"/>
+              <a:t>Both</a:t>
+            </a:r>
+            <a:r>
+              <a:rPr lang="fr-FR" dirty="0" smtClean="0"/>
+              <a:t> </a:t>
+            </a:r>
+            <a:r>
+              <a:rPr lang="fr-FR" dirty="0" err="1" smtClean="0"/>
+              <a:t>can</a:t>
+            </a:r>
+            <a:r>
+              <a:rPr lang="fr-FR" dirty="0" smtClean="0"/>
+              <a:t> </a:t>
+            </a:r>
+            <a:r>
+              <a:rPr lang="fr-FR" dirty="0" err="1" smtClean="0"/>
+              <a:t>execute</a:t>
+            </a:r>
+            <a:r>
+              <a:rPr lang="fr-FR" dirty="0" smtClean="0"/>
+              <a:t> a callback </a:t>
             </a:r>
             <a:r>
               <a:rPr lang="fr-FR" dirty="0" err="1" smtClean="0"/>
@@ -4478,150 +4329,6 @@
             </a:r>
             <a:r>
               <a:rPr lang="fr-FR" dirty="0" smtClean="0"/>
-              <a:t>’ </a:t>
-            </a:r>
-            <a:r>
-              <a:rPr lang="fr-FR" dirty="0" err="1" smtClean="0"/>
-              <a:t>that</a:t>
-            </a:r>
-            <a:r>
-              <a:rPr lang="fr-FR" dirty="0" smtClean="0"/>
-              <a:t> calls the </a:t>
-            </a:r>
-            <a:r>
-              <a:rPr lang="fr-FR" dirty="0" err="1" smtClean="0"/>
-              <a:t>specified</a:t>
-            </a:r>
-            <a:r>
-              <a:rPr lang="fr-FR" dirty="0" smtClean="0"/>
-              <a:t> </a:t>
-            </a:r>
-            <a:r>
-              <a:rPr lang="fr-FR" dirty="0" err="1" smtClean="0"/>
-              <a:t>function</a:t>
-            </a:r>
-            <a:r>
-              <a:rPr lang="fr-FR" dirty="0" smtClean="0"/>
-              <a:t> </a:t>
-            </a:r>
-            <a:r>
-              <a:rPr lang="fr-FR" dirty="0" err="1" smtClean="0"/>
-              <a:t>with</a:t>
-            </a:r>
-            <a:r>
-              <a:rPr lang="fr-FR" dirty="0" smtClean="0"/>
-              <a:t> the </a:t>
-            </a:r>
-            <a:r>
-              <a:rPr lang="fr-FR" dirty="0" err="1" smtClean="0"/>
-              <a:t>parameters</a:t>
-            </a:r>
-            <a:r>
-              <a:rPr lang="fr-FR" dirty="0" smtClean="0"/>
-              <a:t>:</a:t>
-            </a:r>
-          </a:p>
-          <a:p>
-            <a:r>
-              <a:rPr lang="fr-FR" dirty="0" err="1" smtClean="0"/>
-              <a:t>Exp</a:t>
-            </a:r>
-            <a:r>
-              <a:rPr lang="fr-FR" dirty="0" smtClean="0"/>
-              <a:t>:</a:t>
-            </a:r>
-          </a:p>
-          <a:p>
-            <a:r>
-              <a:rPr lang="fr-FR" dirty="0" err="1" smtClean="0"/>
-              <a:t>element.addEventListener</a:t>
-            </a:r>
-            <a:r>
-              <a:rPr lang="fr-FR" dirty="0" smtClean="0"/>
-              <a:t>(‘click’, </a:t>
-            </a:r>
-            <a:r>
-              <a:rPr lang="fr-FR" dirty="0" err="1" smtClean="0"/>
-              <a:t>function</a:t>
-            </a:r>
-            <a:r>
-              <a:rPr lang="fr-FR" dirty="0" smtClean="0"/>
-              <a:t>(){</a:t>
-            </a:r>
-          </a:p>
-          <a:p>
-            <a:r>
-              <a:rPr lang="fr-FR" dirty="0" err="1" smtClean="0"/>
-              <a:t>myFunction</a:t>
-            </a:r>
-            <a:r>
-              <a:rPr lang="fr-FR" dirty="0" smtClean="0"/>
-              <a:t>(p1,p2);})</a:t>
-            </a:r>
-          </a:p>
-          <a:p>
-            <a:r>
-              <a:rPr lang="fr-FR" dirty="0" err="1" smtClean="0"/>
-              <a:t>Hint</a:t>
-            </a:r>
-            <a:r>
-              <a:rPr lang="fr-FR" dirty="0" smtClean="0"/>
-              <a:t>: </a:t>
-            </a:r>
-            <a:r>
-              <a:rPr lang="fr-FR" dirty="0" err="1" smtClean="0"/>
-              <a:t>When</a:t>
-            </a:r>
-            <a:r>
-              <a:rPr lang="fr-FR" dirty="0" smtClean="0"/>
-              <a:t> putting </a:t>
-            </a:r>
-            <a:r>
-              <a:rPr lang="fr-FR" dirty="0" err="1" smtClean="0"/>
-              <a:t>directly</a:t>
-            </a:r>
-            <a:r>
-              <a:rPr lang="fr-FR" dirty="0" smtClean="0"/>
-              <a:t> </a:t>
-            </a:r>
-            <a:r>
-              <a:rPr lang="fr-FR" dirty="0" err="1" smtClean="0"/>
-              <a:t>myFunction</a:t>
-            </a:r>
-            <a:r>
-              <a:rPr lang="fr-FR" dirty="0" smtClean="0"/>
-              <a:t> </a:t>
-            </a:r>
-            <a:r>
-              <a:rPr lang="fr-FR" dirty="0" err="1" smtClean="0"/>
-              <a:t>it</a:t>
-            </a:r>
-            <a:r>
-              <a:rPr lang="fr-FR" dirty="0" smtClean="0"/>
-              <a:t> </a:t>
-            </a:r>
-            <a:r>
-              <a:rPr lang="fr-FR" dirty="0" err="1" smtClean="0"/>
-              <a:t>will</a:t>
-            </a:r>
-            <a:r>
-              <a:rPr lang="fr-FR" dirty="0" smtClean="0"/>
-              <a:t> </a:t>
-            </a:r>
-            <a:r>
-              <a:rPr lang="fr-FR" dirty="0" err="1" smtClean="0"/>
-              <a:t>be</a:t>
-            </a:r>
-            <a:r>
-              <a:rPr lang="fr-FR" dirty="0" smtClean="0"/>
-              <a:t> </a:t>
-            </a:r>
-            <a:r>
-              <a:rPr lang="fr-FR" dirty="0" err="1" smtClean="0"/>
-              <a:t>called</a:t>
-            </a:r>
-            <a:r>
-              <a:rPr lang="fr-FR" dirty="0" smtClean="0"/>
               <a:t> </a:t>
             </a:r>
             <a:r>
@@ -4630,19 +4337,171 @@
             </a:r>
             <a:r>
               <a:rPr lang="fr-FR" dirty="0" smtClean="0"/>
-              <a:t> </a:t>
-            </a:r>
-            <a:r>
-              <a:rPr lang="fr-FR" dirty="0" err="1" smtClean="0"/>
-              <a:t>declaring</a:t>
-            </a:r>
-            <a:r>
-              <a:rPr lang="fr-FR" dirty="0" smtClean="0"/>
-              <a:t> the </a:t>
-            </a:r>
+              <a:t> an </a:t>
+            </a:r>
+            <a:r>
+              <a:rPr lang="fr-FR" dirty="0" err="1" smtClean="0"/>
+              <a:t>element</a:t>
+            </a:r>
+            <a:r>
+              <a:rPr lang="fr-FR" dirty="0" smtClean="0"/>
+              <a:t> -a </a:t>
+            </a:r>
+            <a:r>
+              <a:rPr lang="fr-FR" dirty="0" err="1" smtClean="0"/>
+              <a:t>button</a:t>
+            </a:r>
+            <a:r>
+              <a:rPr lang="fr-FR" dirty="0" smtClean="0"/>
+              <a:t> </a:t>
+            </a:r>
+            <a:r>
+              <a:rPr lang="fr-FR" dirty="0" err="1" smtClean="0"/>
+              <a:t>usually</a:t>
+            </a:r>
+            <a:r>
+              <a:rPr lang="fr-FR" dirty="0"/>
+              <a:t>-</a:t>
+            </a:r>
+            <a:r>
+              <a:rPr lang="fr-FR" dirty="0" smtClean="0"/>
+              <a:t> an image in </a:t>
+            </a:r>
+            <a:r>
+              <a:rPr lang="fr-FR" dirty="0" err="1" smtClean="0"/>
+              <a:t>our</a:t>
+            </a:r>
+            <a:r>
+              <a:rPr lang="fr-FR" dirty="0" smtClean="0"/>
+              <a:t> case </a:t>
+            </a:r>
+            <a:r>
+              <a:rPr lang="fr-FR" dirty="0" err="1" smtClean="0"/>
+              <a:t>is</a:t>
+            </a:r>
+            <a:r>
+              <a:rPr lang="fr-FR" dirty="0" smtClean="0"/>
+              <a:t> </a:t>
+            </a:r>
+            <a:r>
+              <a:rPr lang="fr-FR" dirty="0" err="1" smtClean="0"/>
+              <a:t>clicked</a:t>
+            </a:r>
+            <a:r>
+              <a:rPr lang="fr-FR" dirty="0" smtClean="0"/>
+              <a:t>.</a:t>
+            </a:r>
+          </a:p>
+          <a:p>
+            <a:r>
+              <a:rPr lang="fr-FR" dirty="0" err="1"/>
+              <a:t>o</a:t>
+            </a:r>
+            <a:r>
+              <a:rPr lang="fr-FR" dirty="0" err="1" smtClean="0"/>
+              <a:t>nclick</a:t>
+            </a:r>
+            <a:r>
+              <a:rPr lang="fr-FR" dirty="0" smtClean="0"/>
+              <a:t> </a:t>
+            </a:r>
+            <a:r>
+              <a:rPr lang="fr-FR" dirty="0" err="1" smtClean="0"/>
+              <a:t>can</a:t>
+            </a:r>
+            <a:r>
+              <a:rPr lang="fr-FR" dirty="0" smtClean="0"/>
+              <a:t> </a:t>
+            </a:r>
+            <a:r>
+              <a:rPr lang="fr-FR" dirty="0" err="1" smtClean="0"/>
+              <a:t>only</a:t>
+            </a:r>
+            <a:r>
+              <a:rPr lang="fr-FR" dirty="0" smtClean="0"/>
+              <a:t> </a:t>
+            </a:r>
+            <a:r>
+              <a:rPr lang="fr-FR" dirty="0" err="1" smtClean="0"/>
+              <a:t>add</a:t>
+            </a:r>
+            <a:r>
+              <a:rPr lang="fr-FR" dirty="0" smtClean="0"/>
+              <a:t> a single </a:t>
+            </a:r>
+            <a:r>
+              <a:rPr lang="fr-FR" dirty="0" err="1" smtClean="0"/>
+              <a:t>event</a:t>
+            </a:r>
+            <a:r>
+              <a:rPr lang="fr-FR" dirty="0" smtClean="0"/>
+              <a:t> to an </a:t>
+            </a:r>
+            <a:r>
+              <a:rPr lang="fr-FR" dirty="0" err="1" smtClean="0"/>
+              <a:t>element</a:t>
+            </a:r>
+            <a:r>
+              <a:rPr lang="fr-FR" dirty="0" smtClean="0"/>
+              <a:t>.</a:t>
+            </a:r>
+          </a:p>
+          <a:p>
             <a:r>
               <a:rPr lang="fr-FR" dirty="0" err="1" smtClean="0"/>
               <a:t>addEventListener</a:t>
+            </a:r>
+            <a:r>
+              <a:rPr lang="fr-FR" dirty="0" smtClean="0"/>
+              <a:t> </a:t>
+            </a:r>
+            <a:r>
+              <a:rPr lang="fr-FR" dirty="0" err="1" smtClean="0"/>
+              <a:t>can</a:t>
+            </a:r>
+            <a:r>
+              <a:rPr lang="fr-FR" dirty="0" smtClean="0"/>
+              <a:t> </a:t>
+            </a:r>
+            <a:r>
+              <a:rPr lang="fr-FR" dirty="0" err="1" smtClean="0"/>
+              <a:t>add</a:t>
+            </a:r>
+            <a:r>
+              <a:rPr lang="fr-FR" dirty="0" smtClean="0"/>
+              <a:t> </a:t>
+            </a:r>
+            <a:r>
+              <a:rPr lang="fr-FR" dirty="0" err="1" smtClean="0"/>
+              <a:t>miltiple</a:t>
+            </a:r>
+            <a:r>
+              <a:rPr lang="fr-FR" dirty="0" smtClean="0"/>
+              <a:t> </a:t>
+            </a:r>
+            <a:r>
+              <a:rPr lang="fr-FR" dirty="0" err="1" smtClean="0"/>
+              <a:t>events</a:t>
+            </a:r>
+            <a:r>
+              <a:rPr lang="fr-FR" dirty="0" smtClean="0"/>
+              <a:t> to a </a:t>
+            </a:r>
+            <a:r>
+              <a:rPr lang="fr-FR" dirty="0" err="1" smtClean="0"/>
+              <a:t>particular</a:t>
+            </a:r>
+            <a:r>
+              <a:rPr lang="fr-FR" dirty="0" smtClean="0"/>
+              <a:t> </a:t>
+            </a:r>
+            <a:r>
+              <a:rPr lang="fr-FR" dirty="0" err="1" smtClean="0"/>
+              <a:t>element</a:t>
+            </a:r>
+            <a:r>
+              <a:rPr lang="fr-FR" dirty="0" smtClean="0"/>
+              <a:t>. </a:t>
             </a:r>
             <a:endParaRPr lang="fr-FR" dirty="0"/>
           </a:p>
@@ -4685,28 +4544,46 @@
         </p:nvSpPr>
         <p:spPr/>
         <p:txBody>
-          <a:bodyPr/>
-          <a:lstStyle/>
-          <a:p>
-            <a:r>
-              <a:rPr lang="fr-FR" dirty="0" smtClean="0"/>
-              <a:t>Event </a:t>
-            </a:r>
-            <a:r>
-              <a:rPr lang="fr-FR" dirty="0" err="1" smtClean="0"/>
-              <a:t>Bubbling</a:t>
-            </a:r>
-            <a:r>
-              <a:rPr lang="fr-FR" dirty="0" smtClean="0"/>
-              <a:t> or Event </a:t>
-            </a:r>
-            <a:r>
-              <a:rPr lang="fr-FR" dirty="0" err="1" smtClean="0"/>
-              <a:t>Capturing</a:t>
-            </a:r>
-            <a:r>
-              <a:rPr lang="fr-FR" dirty="0" smtClean="0"/>
-              <a:t>?</a:t>
+          <a:bodyPr>
+            <a:normAutofit fontScale="90000"/>
+          </a:bodyPr>
+          <a:lstStyle/>
+          <a:p>
+            <a:r>
+              <a:rPr lang="fr-FR" dirty="0" err="1" smtClean="0"/>
+              <a:t>Add</a:t>
+            </a:r>
+            <a:r>
+              <a:rPr lang="fr-FR" dirty="0" smtClean="0"/>
+              <a:t> </a:t>
+            </a:r>
+            <a:r>
+              <a:rPr lang="fr-FR" dirty="0" err="1" smtClean="0"/>
+              <a:t>Many</a:t>
+            </a:r>
+            <a:r>
+              <a:rPr lang="fr-FR" dirty="0" smtClean="0"/>
+              <a:t> Event </a:t>
+            </a:r>
+            <a:r>
+              <a:rPr lang="fr-FR" dirty="0" err="1" smtClean="0"/>
+              <a:t>Handlers</a:t>
+            </a:r>
+            <a:r>
+              <a:rPr lang="fr-FR" dirty="0" smtClean="0"/>
+              <a:t> to the </a:t>
+            </a:r>
+            <a:r>
+              <a:rPr lang="fr-FR" dirty="0" err="1" smtClean="0"/>
+              <a:t>Same</a:t>
+            </a:r>
+            <a:r>
+              <a:rPr lang="fr-FR" dirty="0" smtClean="0"/>
+              <a:t> </a:t>
+            </a:r>
+            <a:r>
+              <a:rPr lang="fr-FR" dirty="0" err="1" smtClean="0"/>
+              <a:t>Element</a:t>
             </a:r>
             <a:endParaRPr lang="fr-FR" dirty="0"/>
           </a:p>
@@ -4724,8 +4601,8 @@
         </p:nvSpPr>
         <p:spPr>
           <a:xfrm>
-            <a:off x="0" y="1357298"/>
-            <a:ext cx="9144000" cy="5143536"/>
+            <a:off x="357158" y="1600200"/>
+            <a:ext cx="8786842" cy="4525963"/>
           </a:xfrm>
         </p:spPr>
         <p:txBody>
@@ -4735,44 +4612,128 @@
           <a:lstStyle/>
           <a:p>
             <a:r>
-              <a:rPr lang="fr-FR" dirty="0" smtClean="0"/>
-              <a:t>There are </a:t>
-            </a:r>
-            <a:r>
-              <a:rPr lang="fr-FR" dirty="0" err="1" smtClean="0"/>
-              <a:t>two</a:t>
-            </a:r>
-            <a:r>
-              <a:rPr lang="fr-FR" dirty="0" smtClean="0"/>
-              <a:t> </a:t>
-            </a:r>
-            <a:r>
-              <a:rPr lang="fr-FR" dirty="0" err="1" smtClean="0"/>
-              <a:t>ways</a:t>
-            </a:r>
-            <a:r>
-              <a:rPr lang="fr-FR" dirty="0" smtClean="0"/>
-              <a:t> of </a:t>
-            </a:r>
-            <a:r>
-              <a:rPr lang="fr-FR" dirty="0" err="1" smtClean="0"/>
-              <a:t>event</a:t>
-            </a:r>
-            <a:r>
-              <a:rPr lang="fr-FR" dirty="0" smtClean="0"/>
-              <a:t> propagation in the HTML DOM, </a:t>
-            </a:r>
-            <a:r>
-              <a:rPr lang="fr-FR" dirty="0" err="1" smtClean="0"/>
-              <a:t>bubbling</a:t>
-            </a:r>
-            <a:r>
-              <a:rPr lang="fr-FR" dirty="0" smtClean="0"/>
-              <a:t> and </a:t>
-            </a:r>
-            <a:r>
-              <a:rPr lang="fr-FR" dirty="0" err="1" smtClean="0"/>
-              <a:t>capturing</a:t>
+              <a:rPr lang="fr-FR" dirty="0" err="1" smtClean="0"/>
+              <a:t>addEventListener</a:t>
+            </a:r>
+            <a:r>
+              <a:rPr lang="fr-FR" dirty="0" smtClean="0"/>
+              <a:t>() </a:t>
+            </a:r>
+            <a:r>
+              <a:rPr lang="fr-FR" dirty="0" err="1" smtClean="0"/>
+              <a:t>is</a:t>
+            </a:r>
+            <a:r>
+              <a:rPr lang="fr-FR" dirty="0" smtClean="0"/>
+              <a:t> a </a:t>
+            </a:r>
+            <a:r>
+              <a:rPr lang="fr-FR" dirty="0" err="1" smtClean="0"/>
+              <a:t>method</a:t>
+            </a:r>
+            <a:r>
+              <a:rPr lang="fr-FR" dirty="0" smtClean="0"/>
+              <a:t> </a:t>
+            </a:r>
+            <a:r>
+              <a:rPr lang="fr-FR" dirty="0" err="1" smtClean="0"/>
+              <a:t>that’s</a:t>
+            </a:r>
+            <a:r>
+              <a:rPr lang="fr-FR" dirty="0" smtClean="0"/>
+              <a:t> </a:t>
+            </a:r>
+            <a:r>
+              <a:rPr lang="fr-FR" dirty="0" err="1" smtClean="0"/>
+              <a:t>why</a:t>
+            </a:r>
+            <a:r>
+              <a:rPr lang="fr-FR" dirty="0" smtClean="0"/>
+              <a:t> </a:t>
+            </a:r>
+            <a:r>
+              <a:rPr lang="fr-FR" dirty="0" err="1" smtClean="0"/>
+              <a:t>it</a:t>
+            </a:r>
+            <a:r>
+              <a:rPr lang="fr-FR" dirty="0" smtClean="0"/>
+              <a:t> </a:t>
+            </a:r>
+            <a:r>
+              <a:rPr lang="fr-FR" dirty="0" err="1" smtClean="0"/>
+              <a:t>allows</a:t>
+            </a:r>
+            <a:r>
+              <a:rPr lang="fr-FR" dirty="0" smtClean="0"/>
+              <a:t> to </a:t>
+            </a:r>
+            <a:r>
+              <a:rPr lang="fr-FR" dirty="0" err="1" smtClean="0"/>
+              <a:t>add</a:t>
+            </a:r>
+            <a:r>
+              <a:rPr lang="fr-FR" dirty="0" smtClean="0"/>
+              <a:t> </a:t>
+            </a:r>
+            <a:r>
+              <a:rPr lang="fr-FR" dirty="0" err="1" smtClean="0"/>
+              <a:t>many</a:t>
+            </a:r>
+            <a:r>
+              <a:rPr lang="fr-FR" dirty="0" smtClean="0"/>
+              <a:t> </a:t>
+            </a:r>
+            <a:r>
+              <a:rPr lang="fr-FR" dirty="0" err="1" smtClean="0"/>
+              <a:t>events</a:t>
+            </a:r>
+            <a:r>
+              <a:rPr lang="fr-FR" dirty="0" smtClean="0"/>
+              <a:t> to  the </a:t>
+            </a:r>
+            <a:r>
+              <a:rPr lang="fr-FR" dirty="0" err="1" smtClean="0"/>
+              <a:t>same</a:t>
+            </a:r>
+            <a:r>
+              <a:rPr lang="fr-FR" dirty="0" smtClean="0"/>
+              <a:t> </a:t>
+            </a:r>
+            <a:r>
+              <a:rPr lang="fr-FR" dirty="0" err="1" smtClean="0"/>
+              <a:t>element</a:t>
+            </a:r>
+            <a:r>
+              <a:rPr lang="fr-FR" dirty="0"/>
+              <a:t> </a:t>
+            </a:r>
+            <a:r>
+              <a:rPr lang="fr-FR" dirty="0" err="1" smtClean="0"/>
+              <a:t>without</a:t>
+            </a:r>
+            <a:r>
+              <a:rPr lang="fr-FR" dirty="0" smtClean="0"/>
+              <a:t> </a:t>
+            </a:r>
+            <a:r>
+              <a:rPr lang="fr-FR" dirty="0" err="1" smtClean="0"/>
+              <a:t>overwriting</a:t>
+            </a:r>
+            <a:r>
+              <a:rPr lang="fr-FR" dirty="0" smtClean="0"/>
+              <a:t> </a:t>
+            </a:r>
+            <a:r>
+              <a:rPr lang="fr-FR" dirty="0" err="1" smtClean="0"/>
+              <a:t>existing</a:t>
+            </a:r>
+            <a:r>
+              <a:rPr lang="fr-FR" dirty="0" smtClean="0"/>
+              <a:t> </a:t>
+            </a:r>
+            <a:r>
+              <a:rPr lang="fr-FR" dirty="0" err="1" smtClean="0"/>
+              <a:t>events</a:t>
             </a:r>
             <a:r>
               <a:rPr lang="fr-FR" dirty="0" smtClean="0"/>
@@ -4781,8 +4742,12 @@
           </a:p>
           <a:p>
             <a:r>
-              <a:rPr lang="fr-FR" dirty="0" smtClean="0"/>
-              <a:t>Event propagation </a:t>
+              <a:rPr lang="fr-FR" dirty="0" err="1" smtClean="0"/>
+              <a:t>Onclick</a:t>
+            </a:r>
+            <a:r>
+              <a:rPr lang="fr-FR" dirty="0" smtClean="0"/>
+              <a:t> </a:t>
             </a:r>
             <a:r>
               <a:rPr lang="fr-FR" dirty="0" err="1" smtClean="0"/>
@@ -4794,31 +4759,55 @@
             </a:r>
             <a:r>
               <a:rPr lang="fr-FR" dirty="0" err="1" smtClean="0"/>
-              <a:t>way</a:t>
-            </a:r>
-            <a:r>
-              <a:rPr lang="fr-FR" dirty="0" smtClean="0"/>
-              <a:t> of </a:t>
-            </a:r>
-            <a:r>
-              <a:rPr lang="fr-FR" dirty="0" err="1" smtClean="0"/>
-              <a:t>defining</a:t>
-            </a:r>
-            <a:r>
-              <a:rPr lang="fr-FR" dirty="0" smtClean="0"/>
-              <a:t> the </a:t>
-            </a:r>
-            <a:r>
-              <a:rPr lang="fr-FR" dirty="0" err="1" smtClean="0"/>
-              <a:t>element</a:t>
-            </a:r>
-            <a:r>
-              <a:rPr lang="fr-FR" dirty="0" smtClean="0"/>
-              <a:t> </a:t>
-            </a:r>
-            <a:r>
-              <a:rPr lang="fr-FR" dirty="0" err="1" smtClean="0"/>
-              <a:t>order</a:t>
+              <a:t>proprety</a:t>
+            </a:r>
+            <a:r>
+              <a:rPr lang="fr-FR" dirty="0" smtClean="0"/>
+              <a:t> </a:t>
+            </a:r>
+            <a:r>
+              <a:rPr lang="fr-FR" dirty="0" err="1" smtClean="0"/>
+              <a:t>that’s</a:t>
+            </a:r>
+            <a:r>
+              <a:rPr lang="fr-FR" dirty="0" smtClean="0"/>
+              <a:t> </a:t>
+            </a:r>
+            <a:r>
+              <a:rPr lang="fr-FR" dirty="0" err="1" smtClean="0"/>
+              <a:t>why</a:t>
+            </a:r>
+            <a:r>
+              <a:rPr lang="fr-FR" dirty="0" smtClean="0"/>
+              <a:t> </a:t>
+            </a:r>
+            <a:r>
+              <a:rPr lang="fr-FR" dirty="0" err="1" smtClean="0"/>
+              <a:t>it</a:t>
+            </a:r>
+            <a:r>
+              <a:rPr lang="fr-FR" dirty="0" smtClean="0"/>
+              <a:t> </a:t>
+            </a:r>
+            <a:r>
+              <a:rPr lang="fr-FR" dirty="0" err="1" smtClean="0"/>
+              <a:t>will</a:t>
+            </a:r>
+            <a:r>
+              <a:rPr lang="fr-FR" dirty="0" smtClean="0"/>
+              <a:t> </a:t>
+            </a:r>
+            <a:r>
+              <a:rPr lang="fr-FR" dirty="0" err="1" smtClean="0"/>
+              <a:t>be</a:t>
+            </a:r>
+            <a:r>
+              <a:rPr lang="fr-FR" dirty="0" smtClean="0"/>
+              <a:t> </a:t>
+            </a:r>
+            <a:r>
+              <a:rPr lang="fr-FR" dirty="0" err="1" smtClean="0"/>
+              <a:t>overwrote</a:t>
             </a:r>
             <a:r>
               <a:rPr lang="fr-FR" dirty="0" smtClean="0"/>
@@ -4830,19 +4819,11 @@
             </a:r>
             <a:r>
               <a:rPr lang="fr-FR" dirty="0" smtClean="0"/>
-              <a:t> an </a:t>
-            </a:r>
-            <a:r>
-              <a:rPr lang="fr-FR" dirty="0" err="1" smtClean="0"/>
-              <a:t>event</a:t>
-            </a:r>
-            <a:r>
-              <a:rPr lang="fr-FR" dirty="0" smtClean="0"/>
-              <a:t> </a:t>
-            </a:r>
-            <a:r>
-              <a:rPr lang="fr-FR" dirty="0" err="1" smtClean="0"/>
-              <a:t>occurs</a:t>
+              <a:t> </a:t>
+            </a:r>
+            <a:r>
+              <a:rPr lang="fr-FR" dirty="0" err="1" smtClean="0"/>
+              <a:t>reused</a:t>
             </a:r>
             <a:r>
               <a:rPr lang="fr-FR" dirty="0" smtClean="0"/>
@@ -4852,206 +4833,54 @@
           <a:p>
             <a:r>
               <a:rPr lang="fr-FR" dirty="0" err="1" smtClean="0"/>
-              <a:t>We</a:t>
-            </a:r>
-            <a:r>
-              <a:rPr lang="fr-FR" dirty="0" smtClean="0"/>
-              <a:t> have an &lt;</a:t>
-            </a:r>
-            <a:r>
-              <a:rPr lang="fr-FR" dirty="0" err="1" smtClean="0"/>
-              <a:t>img</a:t>
-            </a:r>
-            <a:r>
-              <a:rPr lang="fr-FR" dirty="0" smtClean="0"/>
-              <a:t>&gt; </a:t>
-            </a:r>
-            <a:r>
-              <a:rPr lang="fr-FR" dirty="0" err="1" smtClean="0"/>
-              <a:t>element</a:t>
-            </a:r>
-            <a:r>
-              <a:rPr lang="fr-FR" dirty="0" smtClean="0"/>
-              <a:t> </a:t>
-            </a:r>
-            <a:r>
-              <a:rPr lang="fr-FR" dirty="0" err="1" smtClean="0"/>
-              <a:t>inside</a:t>
-            </a:r>
-            <a:r>
-              <a:rPr lang="fr-FR" dirty="0" smtClean="0"/>
-              <a:t> a &lt;</a:t>
-            </a:r>
-            <a:r>
-              <a:rPr lang="fr-FR" dirty="0" err="1" smtClean="0"/>
-              <a:t>div</a:t>
-            </a:r>
-            <a:r>
-              <a:rPr lang="fr-FR" dirty="0" smtClean="0"/>
-              <a:t>&gt; </a:t>
-            </a:r>
-            <a:r>
-              <a:rPr lang="fr-FR" dirty="0" err="1" smtClean="0"/>
-              <a:t>element</a:t>
-            </a:r>
-            <a:r>
-              <a:rPr lang="fr-FR" dirty="0" smtClean="0"/>
-              <a:t>, and the user clicks on the &lt;</a:t>
-            </a:r>
-            <a:r>
-              <a:rPr lang="fr-FR" dirty="0" err="1" smtClean="0"/>
-              <a:t>img</a:t>
-            </a:r>
-            <a:r>
-              <a:rPr lang="fr-FR" dirty="0" smtClean="0"/>
-              <a:t>&gt; </a:t>
-            </a:r>
-            <a:r>
-              <a:rPr lang="fr-FR" dirty="0" err="1" smtClean="0"/>
-              <a:t>element</a:t>
-            </a:r>
-            <a:r>
-              <a:rPr lang="fr-FR" dirty="0" smtClean="0"/>
-              <a:t>, </a:t>
-            </a:r>
-            <a:r>
-              <a:rPr lang="fr-FR" dirty="0" err="1" smtClean="0"/>
-              <a:t>which</a:t>
-            </a:r>
-            <a:r>
-              <a:rPr lang="fr-FR" dirty="0" smtClean="0"/>
-              <a:t> </a:t>
-            </a:r>
-            <a:r>
-              <a:rPr lang="fr-FR" dirty="0" err="1" smtClean="0"/>
-              <a:t>element’s</a:t>
-            </a:r>
-            <a:r>
-              <a:rPr lang="fr-FR" dirty="0" smtClean="0"/>
-              <a:t> ‘click’ </a:t>
-            </a:r>
-            <a:r>
-              <a:rPr lang="fr-FR" dirty="0" err="1" smtClean="0"/>
-              <a:t>event</a:t>
-            </a:r>
-            <a:r>
-              <a:rPr lang="fr-FR" dirty="0" smtClean="0"/>
-              <a:t> </a:t>
-            </a:r>
-            <a:r>
-              <a:rPr lang="fr-FR" dirty="0" err="1" smtClean="0"/>
-              <a:t>should</a:t>
-            </a:r>
-            <a:r>
-              <a:rPr lang="fr-FR" dirty="0" smtClean="0"/>
-              <a:t> </a:t>
-            </a:r>
-            <a:r>
-              <a:rPr lang="fr-FR" dirty="0" err="1" smtClean="0"/>
-              <a:t>be</a:t>
-            </a:r>
-            <a:r>
-              <a:rPr lang="fr-FR" dirty="0" smtClean="0"/>
-              <a:t> </a:t>
-            </a:r>
-            <a:r>
-              <a:rPr lang="fr-FR" dirty="0" err="1" smtClean="0"/>
-              <a:t>handled</a:t>
-            </a:r>
-            <a:r>
-              <a:rPr lang="fr-FR" dirty="0" smtClean="0"/>
-              <a:t> first?</a:t>
-            </a:r>
-          </a:p>
-          <a:p>
-            <a:r>
-              <a:rPr lang="fr-FR" dirty="0" err="1" smtClean="0"/>
-              <a:t>Hint</a:t>
-            </a:r>
-            <a:r>
-              <a:rPr lang="fr-FR" dirty="0" smtClean="0"/>
-              <a:t>: </a:t>
-            </a:r>
-            <a:r>
-              <a:rPr lang="fr-FR" dirty="0" err="1" smtClean="0"/>
-              <a:t>When</a:t>
-            </a:r>
-            <a:r>
-              <a:rPr lang="fr-FR" dirty="0" smtClean="0"/>
-              <a:t> the </a:t>
-            </a:r>
-            <a:r>
-              <a:rPr lang="fr-FR" dirty="0" err="1" smtClean="0"/>
-              <a:t>img</a:t>
-            </a:r>
-            <a:r>
-              <a:rPr lang="fr-FR" dirty="0" smtClean="0"/>
-              <a:t> </a:t>
-            </a:r>
-            <a:r>
-              <a:rPr lang="fr-FR" dirty="0" err="1" smtClean="0"/>
-              <a:t>is</a:t>
-            </a:r>
-            <a:r>
-              <a:rPr lang="fr-FR" dirty="0" smtClean="0"/>
-              <a:t> </a:t>
-            </a:r>
-            <a:r>
-              <a:rPr lang="fr-FR" dirty="0" err="1" smtClean="0"/>
-              <a:t>hidden</a:t>
-            </a:r>
-            <a:r>
-              <a:rPr lang="fr-FR" dirty="0" smtClean="0"/>
-              <a:t> the </a:t>
-            </a:r>
-            <a:r>
-              <a:rPr lang="fr-FR" dirty="0" err="1" smtClean="0"/>
-              <a:t>addEventListener</a:t>
-            </a:r>
-            <a:r>
-              <a:rPr lang="fr-FR" dirty="0" smtClean="0"/>
-              <a:t> </a:t>
-            </a:r>
-            <a:r>
-              <a:rPr lang="fr-FR" dirty="0" err="1" smtClean="0"/>
-              <a:t>linked</a:t>
-            </a:r>
-            <a:r>
-              <a:rPr lang="fr-FR" dirty="0" smtClean="0"/>
-              <a:t> to the </a:t>
-            </a:r>
-            <a:r>
-              <a:rPr lang="fr-FR" dirty="0" err="1" smtClean="0"/>
-              <a:t>img</a:t>
-            </a:r>
-            <a:r>
-              <a:rPr lang="fr-FR" dirty="0" smtClean="0"/>
-              <a:t> </a:t>
-            </a:r>
-            <a:r>
-              <a:rPr lang="fr-FR" dirty="0" err="1" smtClean="0"/>
-              <a:t>is</a:t>
-            </a:r>
-            <a:r>
-              <a:rPr lang="fr-FR" dirty="0" smtClean="0"/>
-              <a:t> not </a:t>
-            </a:r>
-            <a:r>
-              <a:rPr lang="fr-FR" dirty="0" err="1" smtClean="0"/>
-              <a:t>invoked</a:t>
-            </a:r>
-            <a:r>
-              <a:rPr lang="fr-FR" dirty="0" smtClean="0"/>
-              <a:t>, </a:t>
-            </a:r>
-            <a:r>
-              <a:rPr lang="fr-FR" dirty="0" err="1" smtClean="0"/>
-              <a:t>what</a:t>
-            </a:r>
-            <a:r>
-              <a:rPr lang="fr-FR" dirty="0" smtClean="0"/>
-              <a:t> to do?</a:t>
-            </a:r>
+              <a:t>Exp</a:t>
+            </a:r>
+            <a:r>
+              <a:rPr lang="fr-FR" dirty="0" smtClean="0"/>
+              <a:t>:</a:t>
+            </a:r>
+          </a:p>
+          <a:p>
+            <a:r>
+              <a:rPr lang="fr-FR" dirty="0" err="1"/>
+              <a:t>e</a:t>
+            </a:r>
+            <a:r>
+              <a:rPr lang="fr-FR" dirty="0" err="1" smtClean="0"/>
+              <a:t>lement.addEventListener</a:t>
+            </a:r>
+            <a:r>
+              <a:rPr lang="fr-FR" dirty="0" smtClean="0"/>
+              <a:t>(‘click’,</a:t>
+            </a:r>
+            <a:r>
+              <a:rPr lang="fr-FR" dirty="0" err="1" smtClean="0"/>
+              <a:t>myfunction</a:t>
+            </a:r>
+            <a:r>
+              <a:rPr lang="fr-FR" dirty="0" smtClean="0"/>
+              <a:t>)</a:t>
+            </a:r>
+          </a:p>
+          <a:p>
+            <a:r>
+              <a:rPr lang="fr-FR" dirty="0" err="1" smtClean="0"/>
+              <a:t>Element.addEventListener</a:t>
+            </a:r>
+            <a:r>
+              <a:rPr lang="fr-FR" dirty="0" smtClean="0"/>
+              <a:t>(‘click’,</a:t>
+            </a:r>
+            <a:r>
+              <a:rPr lang="fr-FR" dirty="0" err="1" smtClean="0"/>
+              <a:t>mysecfunction</a:t>
+            </a:r>
+            <a:r>
+              <a:rPr lang="fr-FR" dirty="0" smtClean="0"/>
+              <a:t>)</a:t>
+            </a:r>
+          </a:p>
+          <a:p>
             <a:endParaRPr lang="fr-FR" dirty="0"/>
           </a:p>
         </p:txBody>
@@ -5097,8 +4926,12 @@
           <a:lstStyle/>
           <a:p>
             <a:r>
-              <a:rPr lang="fr-FR" dirty="0" err="1" smtClean="0"/>
-              <a:t>Bubbling</a:t>
+              <a:rPr lang="fr-FR" dirty="0" smtClean="0"/>
+              <a:t>Passing </a:t>
+            </a:r>
+            <a:r>
+              <a:rPr lang="fr-FR" dirty="0" err="1" smtClean="0"/>
+              <a:t>Parameters</a:t>
             </a:r>
             <a:endParaRPr lang="fr-FR" dirty="0"/>
           </a:p>
@@ -5114,25 +4947,72 @@
             <p:ph idx="1"/>
           </p:nvPr>
         </p:nvSpPr>
-        <p:spPr>
-          <a:xfrm>
-            <a:off x="457200" y="1285860"/>
-            <a:ext cx="8686800" cy="5143536"/>
-          </a:xfrm>
-        </p:spPr>
+        <p:spPr/>
         <p:txBody>
           <a:bodyPr>
-            <a:normAutofit fontScale="92500" lnSpcReduction="10000"/>
+            <a:normAutofit/>
           </a:bodyPr>
           <a:lstStyle/>
           <a:p>
             <a:r>
-              <a:rPr lang="fr-FR" dirty="0" smtClean="0"/>
-              <a:t>In </a:t>
-            </a:r>
-            <a:r>
-              <a:rPr lang="fr-FR" dirty="0" err="1" smtClean="0"/>
-              <a:t>bubbling</a:t>
+              <a:rPr lang="fr-FR" dirty="0" err="1" smtClean="0"/>
+              <a:t>When</a:t>
+            </a:r>
+            <a:r>
+              <a:rPr lang="fr-FR" dirty="0" smtClean="0"/>
+              <a:t> passing </a:t>
+            </a:r>
+            <a:r>
+              <a:rPr lang="fr-FR" dirty="0" err="1" smtClean="0"/>
+              <a:t>parameter</a:t>
+            </a:r>
+            <a:r>
+              <a:rPr lang="fr-FR" dirty="0" smtClean="0"/>
+              <a:t> values, use an  ‘</a:t>
+            </a:r>
+            <a:r>
+              <a:rPr lang="fr-FR" dirty="0" err="1" smtClean="0"/>
+              <a:t>anonymous</a:t>
+            </a:r>
+            <a:r>
+              <a:rPr lang="fr-FR" dirty="0" smtClean="0"/>
+              <a:t> </a:t>
+            </a:r>
+            <a:r>
+              <a:rPr lang="fr-FR" dirty="0" err="1" smtClean="0"/>
+              <a:t>function</a:t>
+            </a:r>
+            <a:r>
+              <a:rPr lang="fr-FR" dirty="0" smtClean="0"/>
+              <a:t>’ </a:t>
+            </a:r>
+            <a:r>
+              <a:rPr lang="fr-FR" dirty="0" err="1" smtClean="0"/>
+              <a:t>that</a:t>
+            </a:r>
+            <a:r>
+              <a:rPr lang="fr-FR" dirty="0" smtClean="0"/>
+              <a:t> calls the </a:t>
+            </a:r>
+            <a:r>
+              <a:rPr lang="fr-FR" dirty="0" err="1" smtClean="0"/>
+              <a:t>specified</a:t>
+            </a:r>
+            <a:r>
+              <a:rPr lang="fr-FR" dirty="0" smtClean="0"/>
+              <a:t> </a:t>
+            </a:r>
+            <a:r>
+              <a:rPr lang="fr-FR" dirty="0" err="1" smtClean="0"/>
+              <a:t>function</a:t>
+            </a:r>
+            <a:r>
+              <a:rPr lang="fr-FR" dirty="0" smtClean="0"/>
+              <a:t> </a:t>
+            </a:r>
+            <a:r>
+              <a:rPr lang="fr-FR" dirty="0" err="1" smtClean="0"/>
+              <a:t>with</a:t>
             </a:r>
             <a:r>
               <a:rPr lang="fr-FR" dirty="0" smtClean="0"/>
@@ -5140,55 +5020,127 @@
             </a:r>
             <a:r>
               <a:rPr lang="fr-FR" dirty="0" err="1" smtClean="0"/>
-              <a:t>inner</a:t>
-            </a:r>
-            <a:r>
-              <a:rPr lang="fr-FR" dirty="0" smtClean="0"/>
-              <a:t> </a:t>
-            </a:r>
-            <a:r>
-              <a:rPr lang="fr-FR" dirty="0" err="1" smtClean="0"/>
-              <a:t>most</a:t>
-            </a:r>
-            <a:r>
-              <a:rPr lang="fr-FR" dirty="0" smtClean="0"/>
-              <a:t> </a:t>
-            </a:r>
-            <a:r>
-              <a:rPr lang="fr-FR" dirty="0" err="1" smtClean="0"/>
-              <a:t>element’s</a:t>
-            </a:r>
-            <a:r>
-              <a:rPr lang="fr-FR" dirty="0" smtClean="0"/>
-              <a:t> </a:t>
-            </a:r>
-            <a:r>
-              <a:rPr lang="fr-FR" dirty="0" err="1" smtClean="0"/>
-              <a:t>event</a:t>
-            </a:r>
-            <a:r>
-              <a:rPr lang="fr-FR" dirty="0" smtClean="0"/>
-              <a:t> </a:t>
-            </a:r>
-            <a:r>
-              <a:rPr lang="fr-FR" dirty="0" err="1" smtClean="0"/>
-              <a:t>is</a:t>
-            </a:r>
-            <a:r>
-              <a:rPr lang="fr-FR" dirty="0" smtClean="0"/>
-              <a:t> </a:t>
-            </a:r>
-            <a:r>
-              <a:rPr lang="fr-FR" dirty="0" err="1" smtClean="0"/>
-              <a:t>handled</a:t>
-            </a:r>
-            <a:r>
-              <a:rPr lang="fr-FR" dirty="0" smtClean="0"/>
-              <a:t>  first and </a:t>
-            </a:r>
-            <a:r>
-              <a:rPr lang="fr-FR" dirty="0" err="1" smtClean="0"/>
-              <a:t>then</a:t>
+              <a:t>parameters</a:t>
+            </a:r>
+            <a:r>
+              <a:rPr lang="fr-FR" dirty="0" smtClean="0"/>
+              <a:t>:</a:t>
+            </a:r>
+          </a:p>
+          <a:p>
+            <a:r>
+              <a:rPr lang="fr-FR" dirty="0" err="1" smtClean="0"/>
+              <a:t>Exp</a:t>
+            </a:r>
+            <a:r>
+              <a:rPr lang="fr-FR" dirty="0" smtClean="0"/>
+              <a:t>:</a:t>
+            </a:r>
+          </a:p>
+          <a:p>
+            <a:r>
+              <a:rPr lang="fr-FR" dirty="0" err="1" smtClean="0"/>
+              <a:t>element.addEventListener</a:t>
+            </a:r>
+            <a:r>
+              <a:rPr lang="fr-FR" dirty="0" smtClean="0"/>
+              <a:t>(‘click’, </a:t>
+            </a:r>
+            <a:r>
+              <a:rPr lang="fr-FR" dirty="0" err="1" smtClean="0"/>
+              <a:t>function</a:t>
+            </a:r>
+            <a:r>
+              <a:rPr lang="fr-FR" dirty="0" smtClean="0"/>
+              <a:t>(){</a:t>
+            </a:r>
+          </a:p>
+          <a:p>
+            <a:r>
+              <a:rPr lang="fr-FR" dirty="0" err="1" smtClean="0"/>
+              <a:t>myFunction</a:t>
+            </a:r>
+            <a:r>
+              <a:rPr lang="fr-FR" dirty="0" smtClean="0"/>
+              <a:t>(p1,p2);})</a:t>
+            </a:r>
+          </a:p>
+          <a:p>
+            <a:r>
+              <a:rPr lang="fr-FR" dirty="0" err="1" smtClean="0"/>
+              <a:t>Hint</a:t>
+            </a:r>
+            <a:r>
+              <a:rPr lang="fr-FR" dirty="0" smtClean="0"/>
+              <a:t>: </a:t>
+            </a:r>
+            <a:r>
+              <a:rPr lang="fr-FR" dirty="0" err="1" smtClean="0"/>
+              <a:t>When</a:t>
+            </a:r>
+            <a:r>
+              <a:rPr lang="fr-FR" dirty="0" smtClean="0"/>
+              <a:t> putting </a:t>
+            </a:r>
+            <a:r>
+              <a:rPr lang="fr-FR" dirty="0" err="1" smtClean="0"/>
+              <a:t>directly</a:t>
+            </a:r>
+            <a:r>
+              <a:rPr lang="fr-FR" dirty="0" smtClean="0"/>
+              <a:t> </a:t>
+            </a:r>
+            <a:r>
+              <a:rPr lang="fr-FR" dirty="0" err="1" smtClean="0"/>
+              <a:t>myFunction</a:t>
+            </a:r>
+            <a:r>
+              <a:rPr lang="fr-FR" dirty="0" smtClean="0"/>
+              <a:t> </a:t>
+            </a:r>
+            <a:r>
+              <a:rPr lang="fr-FR" dirty="0" err="1" smtClean="0"/>
+              <a:t>it</a:t>
+            </a:r>
+            <a:r>
+              <a:rPr lang="fr-FR" dirty="0" smtClean="0"/>
+              <a:t> </a:t>
+            </a:r>
+            <a:r>
+              <a:rPr lang="fr-FR" dirty="0" err="1" smtClean="0"/>
+              <a:t>will</a:t>
+            </a:r>
+            <a:r>
+              <a:rPr lang="fr-FR" dirty="0" smtClean="0"/>
+              <a:t> </a:t>
+            </a:r>
+            <a:r>
+              <a:rPr lang="fr-FR" dirty="0" err="1" smtClean="0"/>
+              <a:t>be</a:t>
+            </a:r>
+            <a:r>
+              <a:rPr lang="fr-FR" dirty="0" smtClean="0"/>
+              <a:t> </a:t>
+            </a:r>
+            <a:r>
+              <a:rPr lang="fr-FR" dirty="0" err="1" smtClean="0"/>
+              <a:t>called</a:t>
+            </a:r>
+            <a:r>
+              <a:rPr lang="fr-FR" dirty="0" smtClean="0"/>
+              <a:t> </a:t>
+            </a:r>
+            <a:r>
+              <a:rPr lang="fr-FR" dirty="0" err="1" smtClean="0"/>
+              <a:t>when</a:t>
+            </a:r>
+            <a:r>
+              <a:rPr lang="fr-FR" dirty="0" smtClean="0"/>
+              <a:t> </a:t>
+            </a:r>
+            <a:r>
+              <a:rPr lang="fr-FR" dirty="0" err="1" smtClean="0"/>
+              <a:t>declaring</a:t>
             </a:r>
             <a:r>
               <a:rPr lang="fr-FR" dirty="0" smtClean="0"/>
@@ -5196,272 +5148,8 @@
             </a:r>
             <a:r>
               <a:rPr lang="fr-FR" dirty="0" err="1" smtClean="0"/>
-              <a:t>outer</a:t>
-            </a:r>
-            <a:r>
-              <a:rPr lang="fr-FR" dirty="0" smtClean="0"/>
-              <a:t>: the &lt;</a:t>
-            </a:r>
-            <a:r>
-              <a:rPr lang="fr-FR" dirty="0" err="1" smtClean="0"/>
-              <a:t>img</a:t>
-            </a:r>
-            <a:r>
-              <a:rPr lang="fr-FR" dirty="0" smtClean="0"/>
-              <a:t>&gt; </a:t>
-            </a:r>
-            <a:r>
-              <a:rPr lang="fr-FR" dirty="0" err="1" smtClean="0"/>
-              <a:t>element’s</a:t>
-            </a:r>
-            <a:r>
-              <a:rPr lang="fr-FR" dirty="0" smtClean="0"/>
-              <a:t> click </a:t>
-            </a:r>
-            <a:r>
-              <a:rPr lang="fr-FR" dirty="0" err="1" smtClean="0"/>
-              <a:t>event</a:t>
-            </a:r>
-            <a:r>
-              <a:rPr lang="fr-FR" dirty="0" smtClean="0"/>
-              <a:t> </a:t>
-            </a:r>
-            <a:r>
-              <a:rPr lang="fr-FR" dirty="0" err="1" smtClean="0"/>
-              <a:t>is</a:t>
-            </a:r>
-            <a:r>
-              <a:rPr lang="fr-FR" dirty="0" smtClean="0"/>
-              <a:t> </a:t>
-            </a:r>
-            <a:r>
-              <a:rPr lang="fr-FR" dirty="0" err="1" smtClean="0"/>
-              <a:t>handled</a:t>
-            </a:r>
-            <a:r>
-              <a:rPr lang="fr-FR" dirty="0" smtClean="0"/>
-              <a:t> first, </a:t>
-            </a:r>
-            <a:r>
-              <a:rPr lang="fr-FR" dirty="0" err="1" smtClean="0"/>
-              <a:t>then</a:t>
-            </a:r>
-            <a:r>
-              <a:rPr lang="fr-FR" dirty="0" smtClean="0"/>
-              <a:t> the &lt;</a:t>
-            </a:r>
-            <a:r>
-              <a:rPr lang="fr-FR" dirty="0" err="1" smtClean="0"/>
-              <a:t>div</a:t>
-            </a:r>
-            <a:r>
-              <a:rPr lang="fr-FR" dirty="0" smtClean="0"/>
-              <a:t>&gt; </a:t>
-            </a:r>
-            <a:r>
-              <a:rPr lang="fr-FR" dirty="0" err="1" smtClean="0"/>
-              <a:t>element’s</a:t>
-            </a:r>
-            <a:r>
-              <a:rPr lang="fr-FR" dirty="0" smtClean="0"/>
-              <a:t> click </a:t>
-            </a:r>
-            <a:r>
-              <a:rPr lang="fr-FR" dirty="0" err="1" smtClean="0"/>
-              <a:t>event</a:t>
-            </a:r>
-            <a:r>
-              <a:rPr lang="fr-FR" dirty="0" smtClean="0"/>
-              <a:t>.</a:t>
-            </a:r>
-          </a:p>
-          <a:p>
-            <a:r>
-              <a:rPr lang="fr-FR" dirty="0" err="1" smtClean="0"/>
-              <a:t>With</a:t>
-            </a:r>
-            <a:r>
-              <a:rPr lang="fr-FR" dirty="0" smtClean="0"/>
-              <a:t> the </a:t>
-            </a:r>
-            <a:r>
-              <a:rPr lang="fr-FR" dirty="0" err="1" smtClean="0"/>
               <a:t>addEventListener</a:t>
             </a:r>
-            <a:r>
-              <a:rPr lang="fr-FR" dirty="0" smtClean="0"/>
-              <a:t>() </a:t>
-            </a:r>
-            <a:r>
-              <a:rPr lang="fr-FR" dirty="0" err="1" smtClean="0"/>
-              <a:t>method</a:t>
-            </a:r>
-            <a:r>
-              <a:rPr lang="fr-FR" dirty="0" smtClean="0"/>
-              <a:t> </a:t>
-            </a:r>
-            <a:r>
-              <a:rPr lang="fr-FR" dirty="0" err="1" smtClean="0"/>
-              <a:t>you</a:t>
-            </a:r>
-            <a:r>
-              <a:rPr lang="fr-FR" dirty="0" smtClean="0"/>
-              <a:t> </a:t>
-            </a:r>
-            <a:r>
-              <a:rPr lang="fr-FR" dirty="0" err="1" smtClean="0"/>
-              <a:t>can</a:t>
-            </a:r>
-            <a:r>
-              <a:rPr lang="fr-FR" dirty="0" smtClean="0"/>
-              <a:t> </a:t>
-            </a:r>
-            <a:r>
-              <a:rPr lang="fr-FR" dirty="0" err="1" smtClean="0"/>
-              <a:t>specify</a:t>
-            </a:r>
-            <a:r>
-              <a:rPr lang="fr-FR" dirty="0" smtClean="0"/>
-              <a:t> the propagation type by </a:t>
-            </a:r>
-            <a:r>
-              <a:rPr lang="fr-FR" dirty="0" err="1" smtClean="0"/>
-              <a:t>using</a:t>
-            </a:r>
-            <a:r>
-              <a:rPr lang="fr-FR" dirty="0" smtClean="0"/>
-              <a:t> the ‘</a:t>
-            </a:r>
-            <a:r>
-              <a:rPr lang="fr-FR" dirty="0" err="1" smtClean="0"/>
-              <a:t>useCapture</a:t>
-            </a:r>
-            <a:r>
-              <a:rPr lang="fr-FR" dirty="0" smtClean="0"/>
-              <a:t>’ </a:t>
-            </a:r>
-            <a:r>
-              <a:rPr lang="fr-FR" dirty="0" err="1" smtClean="0"/>
-              <a:t>parameter</a:t>
-            </a:r>
-            <a:r>
-              <a:rPr lang="fr-FR" dirty="0" smtClean="0"/>
-              <a:t>:</a:t>
-            </a:r>
-          </a:p>
-          <a:p>
-            <a:r>
-              <a:rPr lang="fr-FR" dirty="0" err="1" smtClean="0"/>
-              <a:t>addEventListener</a:t>
-            </a:r>
-            <a:r>
-              <a:rPr lang="fr-FR" dirty="0" smtClean="0"/>
-              <a:t>(</a:t>
-            </a:r>
-            <a:r>
-              <a:rPr lang="fr-FR" dirty="0" err="1" smtClean="0"/>
-              <a:t>event</a:t>
-            </a:r>
-            <a:r>
-              <a:rPr lang="fr-FR" dirty="0" smtClean="0"/>
-              <a:t>, </a:t>
-            </a:r>
-            <a:r>
-              <a:rPr lang="fr-FR" dirty="0" err="1" smtClean="0"/>
-              <a:t>function</a:t>
-            </a:r>
-            <a:r>
-              <a:rPr lang="fr-FR" dirty="0" smtClean="0"/>
-              <a:t>, </a:t>
-            </a:r>
-            <a:r>
-              <a:rPr lang="fr-FR" dirty="0" err="1" smtClean="0"/>
-              <a:t>useCapture</a:t>
-            </a:r>
-            <a:r>
-              <a:rPr lang="fr-FR" dirty="0" smtClean="0"/>
-              <a:t>);</a:t>
-            </a:r>
-          </a:p>
-          <a:p>
-            <a:r>
-              <a:rPr lang="fr-FR" dirty="0" smtClean="0"/>
-              <a:t>The default value </a:t>
-            </a:r>
-            <a:r>
-              <a:rPr lang="fr-FR" dirty="0" err="1" smtClean="0"/>
-              <a:t>is</a:t>
-            </a:r>
-            <a:r>
-              <a:rPr lang="fr-FR" dirty="0" smtClean="0"/>
-              <a:t> false, </a:t>
-            </a:r>
-            <a:r>
-              <a:rPr lang="fr-FR" dirty="0" err="1" smtClean="0"/>
-              <a:t>which</a:t>
-            </a:r>
-            <a:r>
-              <a:rPr lang="fr-FR" dirty="0" smtClean="0"/>
-              <a:t> </a:t>
-            </a:r>
-            <a:r>
-              <a:rPr lang="fr-FR" dirty="0" err="1" smtClean="0"/>
-              <a:t>will</a:t>
-            </a:r>
-            <a:r>
-              <a:rPr lang="fr-FR" dirty="0" smtClean="0"/>
-              <a:t> use the </a:t>
-            </a:r>
-            <a:r>
-              <a:rPr lang="fr-FR" dirty="0" err="1" smtClean="0"/>
-              <a:t>bubbling</a:t>
-            </a:r>
-            <a:r>
-              <a:rPr lang="fr-FR" dirty="0" smtClean="0"/>
-              <a:t> propagation, </a:t>
-            </a:r>
-            <a:r>
-              <a:rPr lang="fr-FR" dirty="0" err="1" smtClean="0"/>
-              <a:t>when</a:t>
-            </a:r>
-            <a:r>
-              <a:rPr lang="fr-FR" dirty="0" smtClean="0"/>
-              <a:t> the value </a:t>
-            </a:r>
-            <a:r>
-              <a:rPr lang="fr-FR" dirty="0" err="1" smtClean="0"/>
-              <a:t>is</a:t>
-            </a:r>
-            <a:r>
-              <a:rPr lang="fr-FR" dirty="0" smtClean="0"/>
-              <a:t> set to </a:t>
-            </a:r>
-            <a:r>
-              <a:rPr lang="fr-FR" dirty="0" err="1" smtClean="0"/>
-              <a:t>true</a:t>
-            </a:r>
-            <a:r>
-              <a:rPr lang="fr-FR" dirty="0" smtClean="0"/>
-              <a:t>, the </a:t>
-            </a:r>
-            <a:r>
-              <a:rPr lang="fr-FR" dirty="0" err="1" smtClean="0"/>
-              <a:t>event</a:t>
-            </a:r>
-            <a:r>
-              <a:rPr lang="fr-FR" dirty="0" smtClean="0"/>
-              <a:t> uses the </a:t>
-            </a:r>
-            <a:r>
-              <a:rPr lang="fr-FR" dirty="0" err="1" smtClean="0"/>
-              <a:t>capturing</a:t>
-            </a:r>
-            <a:r>
-              <a:rPr lang="fr-FR" dirty="0" smtClean="0"/>
-              <a:t> propagation.</a:t>
-            </a:r>
-          </a:p>
-          <a:p>
             <a:endParaRPr lang="fr-FR" dirty="0"/>
           </a:p>
         </p:txBody>
@@ -5507,12 +5195,24 @@
           <a:lstStyle/>
           <a:p>
             <a:r>
+              <a:rPr lang="fr-FR" dirty="0" smtClean="0"/>
+              <a:t>Event </a:t>
+            </a:r>
+            <a:r>
+              <a:rPr lang="fr-FR" dirty="0" err="1" smtClean="0"/>
+              <a:t>Bubbling</a:t>
+            </a:r>
+            <a:r>
+              <a:rPr lang="fr-FR" dirty="0" smtClean="0"/>
+              <a:t> or Event </a:t>
+            </a:r>
+            <a:r>
               <a:rPr lang="fr-FR" dirty="0" err="1" smtClean="0"/>
               <a:t>Capturing</a:t>
             </a:r>
             <a:r>
               <a:rPr lang="fr-FR" dirty="0" smtClean="0"/>
-              <a:t> </a:t>
+              <a:t>?</a:t>
             </a:r>
             <a:endParaRPr lang="fr-FR" dirty="0"/>
           </a:p>
@@ -5528,14 +5228,53 @@
             <p:ph idx="1"/>
           </p:nvPr>
         </p:nvSpPr>
-        <p:spPr/>
-        <p:txBody>
-          <a:bodyPr/>
-          <a:lstStyle/>
-          <a:p>
-            <a:r>
-              <a:rPr lang="fr-FR" dirty="0" smtClean="0"/>
-              <a:t>In </a:t>
+        <p:spPr>
+          <a:xfrm>
+            <a:off x="0" y="1357298"/>
+            <a:ext cx="9144000" cy="5143536"/>
+          </a:xfrm>
+        </p:spPr>
+        <p:txBody>
+          <a:bodyPr>
+            <a:normAutofit/>
+          </a:bodyPr>
+          <a:lstStyle/>
+          <a:p>
+            <a:r>
+              <a:rPr lang="fr-FR" dirty="0" smtClean="0"/>
+              <a:t>There are </a:t>
+            </a:r>
+            <a:r>
+              <a:rPr lang="fr-FR" dirty="0" err="1" smtClean="0"/>
+              <a:t>two</a:t>
+            </a:r>
+            <a:r>
+              <a:rPr lang="fr-FR" dirty="0" smtClean="0"/>
+              <a:t> </a:t>
+            </a:r>
+            <a:r>
+              <a:rPr lang="fr-FR" dirty="0" err="1" smtClean="0"/>
+              <a:t>ways</a:t>
+            </a:r>
+            <a:r>
+              <a:rPr lang="fr-FR" dirty="0" smtClean="0"/>
+              <a:t> of </a:t>
+            </a:r>
+            <a:r>
+              <a:rPr lang="fr-FR" dirty="0" err="1" smtClean="0"/>
+              <a:t>event</a:t>
+            </a:r>
+            <a:r>
+              <a:rPr lang="fr-FR" dirty="0" smtClean="0"/>
+              <a:t> propagation in the HTML DOM, </a:t>
+            </a:r>
+            <a:r>
+              <a:rPr lang="fr-FR" dirty="0" err="1" smtClean="0"/>
+              <a:t>bubbling</a:t>
+            </a:r>
+            <a:r>
+              <a:rPr lang="fr-FR" dirty="0" smtClean="0"/>
+              <a:t> and </a:t>
             </a:r>
             <a:r>
               <a:rPr lang="fr-FR" dirty="0" err="1" smtClean="0"/>
@@ -5543,11 +5282,147 @@
             </a:r>
             <a:r>
               <a:rPr lang="fr-FR" dirty="0" smtClean="0"/>
+              <a:t>.</a:t>
+            </a:r>
+          </a:p>
+          <a:p>
+            <a:r>
+              <a:rPr lang="fr-FR" dirty="0" smtClean="0"/>
+              <a:t>Event propagation </a:t>
+            </a:r>
+            <a:r>
+              <a:rPr lang="fr-FR" dirty="0" err="1" smtClean="0"/>
+              <a:t>is</a:t>
+            </a:r>
+            <a:r>
+              <a:rPr lang="fr-FR" dirty="0" smtClean="0"/>
+              <a:t> a </a:t>
+            </a:r>
+            <a:r>
+              <a:rPr lang="fr-FR" dirty="0" err="1" smtClean="0"/>
+              <a:t>way</a:t>
+            </a:r>
+            <a:r>
+              <a:rPr lang="fr-FR" dirty="0" smtClean="0"/>
+              <a:t> of </a:t>
+            </a:r>
+            <a:r>
+              <a:rPr lang="fr-FR" dirty="0" err="1" smtClean="0"/>
+              <a:t>defining</a:t>
+            </a:r>
+            <a:r>
+              <a:rPr lang="fr-FR" dirty="0" smtClean="0"/>
               <a:t> the </a:t>
             </a:r>
             <a:r>
               <a:rPr lang="fr-FR" dirty="0" err="1" smtClean="0"/>
-              <a:t>outer</a:t>
+              <a:t>element</a:t>
+            </a:r>
+            <a:r>
+              <a:rPr lang="fr-FR" dirty="0" smtClean="0"/>
+              <a:t> </a:t>
+            </a:r>
+            <a:r>
+              <a:rPr lang="fr-FR" dirty="0" err="1" smtClean="0"/>
+              <a:t>order</a:t>
+            </a:r>
+            <a:r>
+              <a:rPr lang="fr-FR" dirty="0" smtClean="0"/>
+              <a:t> </a:t>
+            </a:r>
+            <a:r>
+              <a:rPr lang="fr-FR" dirty="0" err="1" smtClean="0"/>
+              <a:t>when</a:t>
+            </a:r>
+            <a:r>
+              <a:rPr lang="fr-FR" dirty="0" smtClean="0"/>
+              <a:t> an </a:t>
+            </a:r>
+            <a:r>
+              <a:rPr lang="fr-FR" dirty="0" err="1" smtClean="0"/>
+              <a:t>event</a:t>
+            </a:r>
+            <a:r>
+              <a:rPr lang="fr-FR" dirty="0" smtClean="0"/>
+              <a:t> </a:t>
+            </a:r>
+            <a:r>
+              <a:rPr lang="fr-FR" dirty="0" err="1" smtClean="0"/>
+              <a:t>occurs</a:t>
+            </a:r>
+            <a:r>
+              <a:rPr lang="fr-FR" dirty="0" smtClean="0"/>
+              <a:t>.</a:t>
+            </a:r>
+          </a:p>
+          <a:p>
+            <a:r>
+              <a:rPr lang="fr-FR" dirty="0" err="1" smtClean="0"/>
+              <a:t>We</a:t>
+            </a:r>
+            <a:r>
+              <a:rPr lang="fr-FR" dirty="0" smtClean="0"/>
+              <a:t> have an &lt;</a:t>
+            </a:r>
+            <a:r>
+              <a:rPr lang="fr-FR" dirty="0" err="1" smtClean="0"/>
+              <a:t>img</a:t>
+            </a:r>
+            <a:r>
+              <a:rPr lang="fr-FR" dirty="0" smtClean="0"/>
+              <a:t>&gt; </a:t>
+            </a:r>
+            <a:r>
+              <a:rPr lang="fr-FR" dirty="0" err="1" smtClean="0"/>
+              <a:t>element</a:t>
+            </a:r>
+            <a:r>
+              <a:rPr lang="fr-FR" dirty="0" smtClean="0"/>
+              <a:t> </a:t>
+            </a:r>
+            <a:r>
+              <a:rPr lang="fr-FR" dirty="0" err="1" smtClean="0"/>
+              <a:t>inside</a:t>
+            </a:r>
+            <a:r>
+              <a:rPr lang="fr-FR" dirty="0" smtClean="0"/>
+              <a:t> a &lt;</a:t>
+            </a:r>
+            <a:r>
+              <a:rPr lang="fr-FR" dirty="0" err="1" smtClean="0"/>
+              <a:t>div</a:t>
+            </a:r>
+            <a:r>
+              <a:rPr lang="fr-FR" dirty="0" smtClean="0"/>
+              <a:t>&gt; </a:t>
+            </a:r>
+            <a:r>
+              <a:rPr lang="fr-FR" dirty="0" err="1" smtClean="0"/>
+              <a:t>element</a:t>
+            </a:r>
+            <a:r>
+              <a:rPr lang="fr-FR" dirty="0" smtClean="0"/>
+              <a:t>, and the user clicks on the &lt;</a:t>
+            </a:r>
+            <a:r>
+              <a:rPr lang="fr-FR" dirty="0" err="1" smtClean="0"/>
+              <a:t>img</a:t>
+            </a:r>
+            <a:r>
+              <a:rPr lang="fr-FR" dirty="0" smtClean="0"/>
+              <a:t>&gt; </a:t>
+            </a:r>
+            <a:r>
+              <a:rPr lang="fr-FR" dirty="0" err="1" smtClean="0"/>
+              <a:t>element</a:t>
+            </a:r>
+            <a:r>
+              <a:rPr lang="fr-FR" dirty="0" smtClean="0"/>
+              <a:t>, </a:t>
+            </a:r>
+            <a:r>
+              <a:rPr lang="fr-FR" dirty="0" err="1" smtClean="0"/>
+              <a:t>which</a:t>
             </a:r>
             <a:r>
               <a:rPr lang="fr-FR" dirty="0" smtClean="0"/>
@@ -5559,7 +5434,7 @@
             </a:r>
             <a:r>
               <a:rPr lang="fr-FR" dirty="0" smtClean="0"/>
-              <a:t> </a:t>
+              <a:t> ‘click’ </a:t>
             </a:r>
             <a:r>
               <a:rPr lang="fr-FR" dirty="0" err="1" smtClean="0"/>
@@ -5571,6 +5446,56 @@
             </a:r>
             <a:r>
               <a:rPr lang="fr-FR" dirty="0" err="1" smtClean="0"/>
+              <a:t>should</a:t>
+            </a:r>
+            <a:r>
+              <a:rPr lang="fr-FR" dirty="0" smtClean="0"/>
+              <a:t> </a:t>
+            </a:r>
+            <a:r>
+              <a:rPr lang="fr-FR" dirty="0" err="1" smtClean="0"/>
+              <a:t>be</a:t>
+            </a:r>
+            <a:r>
+              <a:rPr lang="fr-FR" dirty="0" smtClean="0"/>
+              <a:t> </a:t>
+            </a:r>
+            <a:r>
+              <a:rPr lang="fr-FR" dirty="0" err="1" smtClean="0"/>
+              <a:t>handled</a:t>
+            </a:r>
+            <a:r>
+              <a:rPr lang="fr-FR" dirty="0" smtClean="0"/>
+              <a:t> first?</a:t>
+            </a:r>
+          </a:p>
+          <a:p>
+            <a:r>
+              <a:rPr lang="fr-FR" dirty="0" err="1" smtClean="0"/>
+              <a:t>Hint</a:t>
+            </a:r>
+            <a:r>
+              <a:rPr lang="fr-FR" dirty="0" smtClean="0"/>
+              <a:t>: </a:t>
+            </a:r>
+            <a:r>
+              <a:rPr lang="fr-FR" dirty="0" err="1" smtClean="0"/>
+              <a:t>When</a:t>
+            </a:r>
+            <a:r>
+              <a:rPr lang="fr-FR" dirty="0" smtClean="0"/>
+              <a:t> the </a:t>
+            </a:r>
+            <a:r>
+              <a:rPr lang="fr-FR" dirty="0" err="1" smtClean="0"/>
+              <a:t>img</a:t>
+            </a:r>
+            <a:r>
+              <a:rPr lang="fr-FR" dirty="0" smtClean="0"/>
+              <a:t> </a:t>
+            </a:r>
+            <a:r>
+              <a:rPr lang="fr-FR" dirty="0" err="1" smtClean="0"/>
               <a:t>is</a:t>
             </a:r>
             <a:r>
@@ -5579,15 +5504,7 @@
             </a:r>
             <a:r>
               <a:rPr lang="fr-FR" dirty="0" err="1" smtClean="0"/>
-              <a:t>handled</a:t>
-            </a:r>
-            <a:r>
-              <a:rPr lang="fr-FR" dirty="0" smtClean="0"/>
-              <a:t> first and </a:t>
-            </a:r>
-            <a:r>
-              <a:rPr lang="fr-FR" dirty="0" err="1" smtClean="0"/>
-              <a:t>then</a:t>
+              <a:t>hidden</a:t>
             </a:r>
             <a:r>
               <a:rPr lang="fr-FR" dirty="0" smtClean="0"/>
@@ -5595,67 +5512,19 @@
             </a:r>
             <a:r>
               <a:rPr lang="fr-FR" dirty="0" err="1" smtClean="0"/>
-              <a:t>inner</a:t>
-            </a:r>
-            <a:r>
-              <a:rPr lang="fr-FR" dirty="0" smtClean="0"/>
-              <a:t>: the &lt;</a:t>
-            </a:r>
-            <a:r>
-              <a:rPr lang="fr-FR" dirty="0" err="1" smtClean="0"/>
-              <a:t>div</a:t>
-            </a:r>
-            <a:r>
-              <a:rPr lang="fr-FR" dirty="0" smtClean="0"/>
-              <a:t>&gt; </a:t>
-            </a:r>
-            <a:r>
-              <a:rPr lang="fr-FR" dirty="0" err="1" smtClean="0"/>
-              <a:t>element’s</a:t>
-            </a:r>
-            <a:r>
-              <a:rPr lang="fr-FR" dirty="0" smtClean="0"/>
-              <a:t> click </a:t>
-            </a:r>
-            <a:r>
-              <a:rPr lang="fr-FR" dirty="0" err="1" smtClean="0"/>
-              <a:t>event</a:t>
-            </a:r>
-            <a:r>
-              <a:rPr lang="fr-FR" dirty="0" smtClean="0"/>
-              <a:t> </a:t>
-            </a:r>
-            <a:r>
-              <a:rPr lang="fr-FR" dirty="0" err="1" smtClean="0"/>
-              <a:t>will</a:t>
-            </a:r>
-            <a:r>
-              <a:rPr lang="fr-FR" dirty="0" smtClean="0"/>
-              <a:t> </a:t>
-            </a:r>
-            <a:r>
-              <a:rPr lang="fr-FR" dirty="0" err="1" smtClean="0"/>
-              <a:t>be</a:t>
-            </a:r>
-            <a:r>
-              <a:rPr lang="fr-FR" dirty="0" smtClean="0"/>
-              <a:t> </a:t>
-            </a:r>
-            <a:r>
-              <a:rPr lang="fr-FR" dirty="0" err="1" smtClean="0"/>
-              <a:t>handled</a:t>
-            </a:r>
-            <a:r>
-              <a:rPr lang="fr-FR" dirty="0" smtClean="0"/>
-              <a:t> first </a:t>
-            </a:r>
-            <a:r>
-              <a:rPr lang="fr-FR" dirty="0" err="1" smtClean="0"/>
-              <a:t>then</a:t>
-            </a:r>
-            <a:r>
-              <a:rPr lang="fr-FR" dirty="0" smtClean="0"/>
-              <a:t> the &lt;</a:t>
+              <a:t>addEventListener</a:t>
+            </a:r>
+            <a:r>
+              <a:rPr lang="fr-FR" dirty="0" smtClean="0"/>
+              <a:t> </a:t>
+            </a:r>
+            <a:r>
+              <a:rPr lang="fr-FR" dirty="0" err="1" smtClean="0"/>
+              <a:t>linked</a:t>
+            </a:r>
+            <a:r>
+              <a:rPr lang="fr-FR" dirty="0" smtClean="0"/>
+              <a:t> to the </a:t>
             </a:r>
             <a:r>
               <a:rPr lang="fr-FR" dirty="0" err="1" smtClean="0"/>
@@ -5663,46 +5532,32 @@
             </a:r>
             <a:r>
               <a:rPr lang="fr-FR" dirty="0" smtClean="0"/>
-              <a:t>&gt; </a:t>
-            </a:r>
-            <a:r>
-              <a:rPr lang="fr-FR" dirty="0" err="1" smtClean="0"/>
-              <a:t>element’s</a:t>
-            </a:r>
-            <a:r>
-              <a:rPr lang="fr-FR" dirty="0" smtClean="0"/>
-              <a:t> click </a:t>
-            </a:r>
-            <a:r>
-              <a:rPr lang="fr-FR" dirty="0" err="1" smtClean="0"/>
-              <a:t>event</a:t>
-            </a:r>
-            <a:r>
-              <a:rPr lang="fr-FR" dirty="0" smtClean="0"/>
-              <a:t>.</a:t>
-            </a:r>
-          </a:p>
-          <a:p>
-            <a:r>
-              <a:rPr lang="fr-FR" dirty="0" err="1" smtClean="0"/>
-              <a:t>Exp</a:t>
-            </a:r>
-            <a:r>
-              <a:rPr lang="fr-FR" dirty="0" smtClean="0"/>
-              <a:t>:</a:t>
-            </a:r>
-          </a:p>
-          <a:p>
-            <a:r>
-              <a:rPr lang="fr-FR" dirty="0" err="1" smtClean="0"/>
-              <a:t>document.getElementById</a:t>
-            </a:r>
-            <a:r>
-              <a:rPr lang="fr-FR" dirty="0" smtClean="0"/>
-              <a:t>(‘img1’).</a:t>
-            </a:r>
-          </a:p>
-          <a:p>
+              <a:t> </a:t>
+            </a:r>
+            <a:r>
+              <a:rPr lang="fr-FR" dirty="0" err="1" smtClean="0"/>
+              <a:t>is</a:t>
+            </a:r>
+            <a:r>
+              <a:rPr lang="fr-FR" dirty="0" smtClean="0"/>
+              <a:t> not </a:t>
+            </a:r>
+            <a:r>
+              <a:rPr lang="fr-FR" dirty="0" err="1" smtClean="0"/>
+              <a:t>invoked</a:t>
+            </a:r>
+            <a:r>
+              <a:rPr lang="fr-FR" dirty="0" smtClean="0"/>
+              <a:t>, </a:t>
+            </a:r>
+            <a:r>
+              <a:rPr lang="fr-FR" dirty="0" err="1" smtClean="0"/>
+              <a:t>what</a:t>
+            </a:r>
+            <a:r>
+              <a:rPr lang="fr-FR" dirty="0" smtClean="0"/>
+              <a:t> to do?</a:t>
+            </a:r>
             <a:endParaRPr lang="fr-FR" dirty="0"/>
           </a:p>
         </p:txBody>
@@ -5748,12 +5603,8 @@
           <a:lstStyle/>
           <a:p>
             <a:r>
-              <a:rPr lang="fr-FR" dirty="0" smtClean="0"/>
-              <a:t>The </a:t>
-            </a:r>
-            <a:r>
-              <a:rPr lang="fr-FR" dirty="0" err="1" smtClean="0"/>
-              <a:t>removeEventListener</a:t>
+              <a:rPr lang="fr-FR" dirty="0" err="1" smtClean="0"/>
+              <a:t>Bubbling</a:t>
             </a:r>
             <a:endParaRPr lang="fr-FR" dirty="0"/>
           </a:p>
@@ -5769,18 +5620,183 @@
             <p:ph idx="1"/>
           </p:nvPr>
         </p:nvSpPr>
-        <p:spPr/>
-        <p:txBody>
-          <a:bodyPr/>
-          <a:lstStyle/>
-          <a:p>
-            <a:r>
-              <a:rPr lang="fr-FR" dirty="0" err="1" smtClean="0"/>
-              <a:t>It’s</a:t>
-            </a:r>
-            <a:r>
-              <a:rPr lang="fr-FR" dirty="0" smtClean="0"/>
-              <a:t> a </a:t>
+        <p:spPr>
+          <a:xfrm>
+            <a:off x="457200" y="1285860"/>
+            <a:ext cx="8686800" cy="5143536"/>
+          </a:xfrm>
+        </p:spPr>
+        <p:txBody>
+          <a:bodyPr>
+            <a:normAutofit fontScale="92500" lnSpcReduction="10000"/>
+          </a:bodyPr>
+          <a:lstStyle/>
+          <a:p>
+            <a:r>
+              <a:rPr lang="fr-FR" dirty="0" smtClean="0"/>
+              <a:t>In </a:t>
+            </a:r>
+            <a:r>
+              <a:rPr lang="fr-FR" dirty="0" err="1" smtClean="0"/>
+              <a:t>bubbling</a:t>
+            </a:r>
+            <a:r>
+              <a:rPr lang="fr-FR" dirty="0" smtClean="0"/>
+              <a:t> the </a:t>
+            </a:r>
+            <a:r>
+              <a:rPr lang="fr-FR" dirty="0" err="1" smtClean="0"/>
+              <a:t>inner</a:t>
+            </a:r>
+            <a:r>
+              <a:rPr lang="fr-FR" dirty="0" smtClean="0"/>
+              <a:t> </a:t>
+            </a:r>
+            <a:r>
+              <a:rPr lang="fr-FR" dirty="0" err="1" smtClean="0"/>
+              <a:t>most</a:t>
+            </a:r>
+            <a:r>
+              <a:rPr lang="fr-FR" dirty="0" smtClean="0"/>
+              <a:t> </a:t>
+            </a:r>
+            <a:r>
+              <a:rPr lang="fr-FR" dirty="0" err="1" smtClean="0"/>
+              <a:t>element’s</a:t>
+            </a:r>
+            <a:r>
+              <a:rPr lang="fr-FR" dirty="0" smtClean="0"/>
+              <a:t> </a:t>
+            </a:r>
+            <a:r>
+              <a:rPr lang="fr-FR" dirty="0" err="1" smtClean="0"/>
+              <a:t>event</a:t>
+            </a:r>
+            <a:r>
+              <a:rPr lang="fr-FR" dirty="0" smtClean="0"/>
+              <a:t> </a:t>
+            </a:r>
+            <a:r>
+              <a:rPr lang="fr-FR" dirty="0" err="1" smtClean="0"/>
+              <a:t>is</a:t>
+            </a:r>
+            <a:r>
+              <a:rPr lang="fr-FR" dirty="0" smtClean="0"/>
+              <a:t> </a:t>
+            </a:r>
+            <a:r>
+              <a:rPr lang="fr-FR" dirty="0" err="1" smtClean="0"/>
+              <a:t>handled</a:t>
+            </a:r>
+            <a:r>
+              <a:rPr lang="fr-FR" dirty="0" smtClean="0"/>
+              <a:t>  first and </a:t>
+            </a:r>
+            <a:r>
+              <a:rPr lang="fr-FR" dirty="0" err="1" smtClean="0"/>
+              <a:t>then</a:t>
+            </a:r>
+            <a:r>
+              <a:rPr lang="fr-FR" dirty="0" smtClean="0"/>
+              <a:t> the </a:t>
+            </a:r>
+            <a:r>
+              <a:rPr lang="fr-FR" dirty="0" err="1" smtClean="0"/>
+              <a:t>outer</a:t>
+            </a:r>
+            <a:r>
+              <a:rPr lang="fr-FR" dirty="0" smtClean="0"/>
+              <a:t>: the &lt;</a:t>
+            </a:r>
+            <a:r>
+              <a:rPr lang="fr-FR" dirty="0" err="1" smtClean="0"/>
+              <a:t>img</a:t>
+            </a:r>
+            <a:r>
+              <a:rPr lang="fr-FR" dirty="0" smtClean="0"/>
+              <a:t>&gt; </a:t>
+            </a:r>
+            <a:r>
+              <a:rPr lang="fr-FR" dirty="0" err="1" smtClean="0"/>
+              <a:t>element’s</a:t>
+            </a:r>
+            <a:r>
+              <a:rPr lang="fr-FR" dirty="0" smtClean="0"/>
+              <a:t> click </a:t>
+            </a:r>
+            <a:r>
+              <a:rPr lang="fr-FR" dirty="0" err="1" smtClean="0"/>
+              <a:t>event</a:t>
+            </a:r>
+            <a:r>
+              <a:rPr lang="fr-FR" dirty="0" smtClean="0"/>
+              <a:t> </a:t>
+            </a:r>
+            <a:r>
+              <a:rPr lang="fr-FR" dirty="0" err="1" smtClean="0"/>
+              <a:t>is</a:t>
+            </a:r>
+            <a:r>
+              <a:rPr lang="fr-FR" dirty="0" smtClean="0"/>
+              <a:t> </a:t>
+            </a:r>
+            <a:r>
+              <a:rPr lang="fr-FR" dirty="0" err="1" smtClean="0"/>
+              <a:t>handled</a:t>
+            </a:r>
+            <a:r>
+              <a:rPr lang="fr-FR" dirty="0" smtClean="0"/>
+              <a:t> first, </a:t>
+            </a:r>
+            <a:r>
+              <a:rPr lang="fr-FR" dirty="0" err="1" smtClean="0"/>
+              <a:t>then</a:t>
+            </a:r>
+            <a:r>
+              <a:rPr lang="fr-FR" dirty="0" smtClean="0"/>
+              <a:t> the &lt;</a:t>
+            </a:r>
+            <a:r>
+              <a:rPr lang="fr-FR" dirty="0" err="1" smtClean="0"/>
+              <a:t>div</a:t>
+            </a:r>
+            <a:r>
+              <a:rPr lang="fr-FR" dirty="0" smtClean="0"/>
+              <a:t>&gt; </a:t>
+            </a:r>
+            <a:r>
+              <a:rPr lang="fr-FR" dirty="0" err="1" smtClean="0"/>
+              <a:t>element’s</a:t>
+            </a:r>
+            <a:r>
+              <a:rPr lang="fr-FR" dirty="0" smtClean="0"/>
+              <a:t> click </a:t>
+            </a:r>
+            <a:r>
+              <a:rPr lang="fr-FR" dirty="0" err="1" smtClean="0"/>
+              <a:t>event</a:t>
+            </a:r>
+            <a:r>
+              <a:rPr lang="fr-FR" dirty="0" smtClean="0"/>
+              <a:t>.</a:t>
+            </a:r>
+          </a:p>
+          <a:p>
+            <a:r>
+              <a:rPr lang="fr-FR" dirty="0" err="1" smtClean="0"/>
+              <a:t>With</a:t>
+            </a:r>
+            <a:r>
+              <a:rPr lang="fr-FR" dirty="0" smtClean="0"/>
+              <a:t> the </a:t>
+            </a:r>
+            <a:r>
+              <a:rPr lang="fr-FR" dirty="0" err="1" smtClean="0"/>
+              <a:t>addEventListener</a:t>
+            </a:r>
+            <a:r>
+              <a:rPr lang="fr-FR" dirty="0" smtClean="0"/>
+              <a:t>() </a:t>
             </a:r>
             <a:r>
               <a:rPr lang="fr-FR" dirty="0" err="1" smtClean="0"/>
@@ -5792,19 +5808,61 @@
             </a:r>
             <a:r>
               <a:rPr lang="fr-FR" dirty="0" err="1" smtClean="0"/>
-              <a:t>that</a:t>
-            </a:r>
-            <a:r>
-              <a:rPr lang="fr-FR" dirty="0" smtClean="0"/>
-              <a:t> </a:t>
-            </a:r>
-            <a:r>
-              <a:rPr lang="fr-FR" dirty="0" err="1" smtClean="0"/>
-              <a:t>removes</a:t>
-            </a:r>
-            <a:r>
-              <a:rPr lang="fr-FR" dirty="0" smtClean="0"/>
-              <a:t> </a:t>
+              <a:t>you</a:t>
+            </a:r>
+            <a:r>
+              <a:rPr lang="fr-FR" dirty="0" smtClean="0"/>
+              <a:t> </a:t>
+            </a:r>
+            <a:r>
+              <a:rPr lang="fr-FR" dirty="0" err="1" smtClean="0"/>
+              <a:t>can</a:t>
+            </a:r>
+            <a:r>
+              <a:rPr lang="fr-FR" dirty="0" smtClean="0"/>
+              <a:t> </a:t>
+            </a:r>
+            <a:r>
+              <a:rPr lang="fr-FR" dirty="0" err="1" smtClean="0"/>
+              <a:t>specify</a:t>
+            </a:r>
+            <a:r>
+              <a:rPr lang="fr-FR" dirty="0" smtClean="0"/>
+              <a:t> the propagation type by </a:t>
+            </a:r>
+            <a:r>
+              <a:rPr lang="fr-FR" dirty="0" err="1" smtClean="0"/>
+              <a:t>using</a:t>
+            </a:r>
+            <a:r>
+              <a:rPr lang="fr-FR" dirty="0" smtClean="0"/>
+              <a:t> the ‘</a:t>
+            </a:r>
+            <a:r>
+              <a:rPr lang="fr-FR" dirty="0" err="1" smtClean="0"/>
+              <a:t>useCapture</a:t>
+            </a:r>
+            <a:r>
+              <a:rPr lang="fr-FR" dirty="0" smtClean="0"/>
+              <a:t>’ </a:t>
+            </a:r>
+            <a:r>
+              <a:rPr lang="fr-FR" dirty="0" err="1" smtClean="0"/>
+              <a:t>parameter</a:t>
+            </a:r>
+            <a:r>
+              <a:rPr lang="fr-FR" dirty="0" smtClean="0"/>
+              <a:t>:</a:t>
+            </a:r>
+          </a:p>
+          <a:p>
+            <a:r>
+              <a:rPr lang="fr-FR" dirty="0" err="1" smtClean="0"/>
+              <a:t>addEventListener</a:t>
+            </a:r>
+            <a:r>
+              <a:rPr lang="fr-FR" dirty="0" smtClean="0"/>
+              <a:t>(</a:t>
             </a:r>
             <a:r>
               <a:rPr lang="fr-FR" dirty="0" err="1" smtClean="0"/>
@@ -5812,84 +5870,104 @@
             </a:r>
             <a:r>
               <a:rPr lang="fr-FR" dirty="0" smtClean="0"/>
-              <a:t> </a:t>
-            </a:r>
-            <a:r>
-              <a:rPr lang="fr-FR" dirty="0" err="1" smtClean="0"/>
-              <a:t>handlers</a:t>
-            </a:r>
-            <a:r>
-              <a:rPr lang="fr-FR" dirty="0" smtClean="0"/>
-              <a:t> </a:t>
-            </a:r>
-            <a:r>
-              <a:rPr lang="fr-FR" dirty="0" err="1" smtClean="0"/>
-              <a:t>that</a:t>
-            </a:r>
-            <a:r>
-              <a:rPr lang="fr-FR" dirty="0" smtClean="0"/>
-              <a:t> have been </a:t>
-            </a:r>
-            <a:r>
-              <a:rPr lang="fr-FR" dirty="0" err="1" smtClean="0"/>
-              <a:t>attached</a:t>
-            </a:r>
-            <a:r>
-              <a:rPr lang="fr-FR" dirty="0" smtClean="0"/>
-              <a:t> </a:t>
-            </a:r>
-            <a:r>
-              <a:rPr lang="fr-FR" dirty="0" err="1" smtClean="0"/>
-              <a:t>with</a:t>
-            </a:r>
-            <a:r>
-              <a:rPr lang="fr-FR" dirty="0" smtClean="0"/>
-              <a:t> the </a:t>
-            </a:r>
-            <a:r>
-              <a:rPr lang="fr-FR" dirty="0" err="1" smtClean="0"/>
-              <a:t>addEventListener</a:t>
-            </a:r>
-            <a:r>
-              <a:rPr lang="fr-FR" dirty="0" smtClean="0"/>
-              <a:t> </a:t>
-            </a:r>
-            <a:r>
-              <a:rPr lang="fr-FR" dirty="0" err="1" smtClean="0"/>
-              <a:t>method</a:t>
-            </a:r>
-            <a:r>
-              <a:rPr lang="fr-FR" dirty="0" smtClean="0"/>
-              <a:t>.</a:t>
-            </a:r>
-          </a:p>
-          <a:p>
-            <a:r>
-              <a:rPr lang="fr-FR" dirty="0" err="1" smtClean="0"/>
-              <a:t>Exp</a:t>
-            </a:r>
-            <a:r>
-              <a:rPr lang="fr-FR" dirty="0" smtClean="0"/>
-              <a:t>:</a:t>
-            </a:r>
-          </a:p>
-          <a:p>
-            <a:r>
-              <a:rPr lang="fr-FR" dirty="0" err="1" smtClean="0"/>
-              <a:t>Element.removeEventListener</a:t>
-            </a:r>
-            <a:r>
-              <a:rPr lang="fr-FR" dirty="0" smtClean="0"/>
-              <a:t>(‘click’,</a:t>
-            </a:r>
-            <a:r>
-              <a:rPr lang="fr-FR" dirty="0" err="1" smtClean="0"/>
-              <a:t>myFunction</a:t>
+              <a:t>, </a:t>
+            </a:r>
+            <a:r>
+              <a:rPr lang="fr-FR" dirty="0" err="1" smtClean="0"/>
+              <a:t>function</a:t>
+            </a:r>
+            <a:r>
+              <a:rPr lang="fr-FR" dirty="0" smtClean="0"/>
+              <a:t>, </a:t>
+            </a:r>
+            <a:r>
+              <a:rPr lang="fr-FR" dirty="0" err="1" smtClean="0"/>
+              <a:t>useCapture</a:t>
             </a:r>
             <a:r>
               <a:rPr lang="fr-FR" dirty="0" smtClean="0"/>
               <a:t>);</a:t>
             </a:r>
+          </a:p>
+          <a:p>
+            <a:r>
+              <a:rPr lang="fr-FR" dirty="0" smtClean="0"/>
+              <a:t>The default value </a:t>
+            </a:r>
+            <a:r>
+              <a:rPr lang="fr-FR" dirty="0" err="1" smtClean="0"/>
+              <a:t>is</a:t>
+            </a:r>
+            <a:r>
+              <a:rPr lang="fr-FR" dirty="0" smtClean="0"/>
+              <a:t> false, </a:t>
+            </a:r>
+            <a:r>
+              <a:rPr lang="fr-FR" dirty="0" err="1" smtClean="0"/>
+              <a:t>which</a:t>
+            </a:r>
+            <a:r>
+              <a:rPr lang="fr-FR" dirty="0" smtClean="0"/>
+              <a:t> </a:t>
+            </a:r>
+            <a:r>
+              <a:rPr lang="fr-FR" dirty="0" err="1" smtClean="0"/>
+              <a:t>will</a:t>
+            </a:r>
+            <a:r>
+              <a:rPr lang="fr-FR" dirty="0" smtClean="0"/>
+              <a:t> use the </a:t>
+            </a:r>
+            <a:r>
+              <a:rPr lang="fr-FR" dirty="0" err="1" smtClean="0"/>
+              <a:t>bubbling</a:t>
+            </a:r>
+            <a:r>
+              <a:rPr lang="fr-FR" dirty="0" smtClean="0"/>
+              <a:t> propagation, </a:t>
+            </a:r>
+            <a:r>
+              <a:rPr lang="fr-FR" dirty="0" err="1" smtClean="0"/>
+              <a:t>when</a:t>
+            </a:r>
+            <a:r>
+              <a:rPr lang="fr-FR" dirty="0" smtClean="0"/>
+              <a:t> the value </a:t>
+            </a:r>
+            <a:r>
+              <a:rPr lang="fr-FR" dirty="0" err="1" smtClean="0"/>
+              <a:t>is</a:t>
+            </a:r>
+            <a:r>
+              <a:rPr lang="fr-FR" dirty="0" smtClean="0"/>
+              <a:t> set to </a:t>
+            </a:r>
+            <a:r>
+              <a:rPr lang="fr-FR" dirty="0" err="1" smtClean="0"/>
+              <a:t>true</a:t>
+            </a:r>
+            <a:r>
+              <a:rPr lang="fr-FR" dirty="0" smtClean="0"/>
+              <a:t>, the </a:t>
+            </a:r>
+            <a:r>
+              <a:rPr lang="fr-FR" dirty="0" err="1" smtClean="0"/>
+              <a:t>event</a:t>
+            </a:r>
+            <a:r>
+              <a:rPr lang="fr-FR" dirty="0" smtClean="0"/>
+              <a:t> uses the </a:t>
+            </a:r>
+            <a:r>
+              <a:rPr lang="fr-FR" dirty="0" err="1" smtClean="0"/>
+              <a:t>capturing</a:t>
+            </a:r>
+            <a:r>
+              <a:rPr lang="fr-FR" dirty="0" smtClean="0"/>
+              <a:t> propagation.</a:t>
+            </a:r>
+          </a:p>
+          <a:p>
             <a:endParaRPr lang="fr-FR" dirty="0"/>
           </a:p>
         </p:txBody>
@@ -5934,7 +6012,15 @@
           <a:bodyPr/>
           <a:lstStyle/>
           <a:p>
-            <a:endParaRPr lang="fr-FR"/>
+            <a:r>
+              <a:rPr lang="fr-FR" dirty="0" err="1" smtClean="0"/>
+              <a:t>Capturing</a:t>
+            </a:r>
+            <a:r>
+              <a:rPr lang="fr-FR" dirty="0" smtClean="0"/>
+              <a:t> </a:t>
+            </a:r>
+            <a:endParaRPr lang="fr-FR" dirty="0"/>
           </a:p>
         </p:txBody>
       </p:sp>
@@ -5954,40 +6040,176 @@
           <a:lstStyle/>
           <a:p>
             <a:r>
-              <a:rPr lang="en-US" dirty="0" smtClean="0"/>
-              <a:t>//how to get clicked images?</a:t>
-            </a:r>
-          </a:p>
-          <a:p>
-            <a:r>
-              <a:rPr lang="en-US" dirty="0" smtClean="0"/>
-              <a:t>//how to add a click event to an image?</a:t>
-            </a:r>
-          </a:p>
-          <a:p>
-            <a:r>
-              <a:rPr lang="en-US" dirty="0" smtClean="0"/>
-              <a:t>//how to get the id of the clicked image?</a:t>
-            </a:r>
-          </a:p>
-          <a:p>
-            <a:r>
-              <a:rPr lang="en-US" dirty="0" smtClean="0"/>
-              <a:t>//how to get the attribute of the clicked image?</a:t>
-            </a:r>
-          </a:p>
-          <a:p>
-            <a:r>
-              <a:rPr lang="en-US" dirty="0" smtClean="0"/>
-              <a:t>//display: none;</a:t>
-            </a:r>
-          </a:p>
-          <a:p>
-            <a:r>
-              <a:rPr lang="en-US" smtClean="0"/>
-              <a:t>//visibility: hidden;</a:t>
-            </a:r>
-            <a:endParaRPr lang="fr-FR"/>
+              <a:rPr lang="fr-FR" dirty="0" smtClean="0"/>
+              <a:t>In </a:t>
+            </a:r>
+            <a:r>
+              <a:rPr lang="fr-FR" dirty="0" err="1" smtClean="0"/>
+              <a:t>capturing</a:t>
+            </a:r>
+            <a:r>
+              <a:rPr lang="fr-FR" dirty="0" smtClean="0"/>
+              <a:t> the </a:t>
+            </a:r>
+            <a:r>
+              <a:rPr lang="fr-FR" dirty="0" err="1" smtClean="0"/>
+              <a:t>outer</a:t>
+            </a:r>
+            <a:r>
+              <a:rPr lang="fr-FR" dirty="0" smtClean="0"/>
+              <a:t> </a:t>
+            </a:r>
+            <a:r>
+              <a:rPr lang="fr-FR" dirty="0" err="1" smtClean="0"/>
+              <a:t>element’s</a:t>
+            </a:r>
+            <a:r>
+              <a:rPr lang="fr-FR" dirty="0" smtClean="0"/>
+              <a:t> </a:t>
+            </a:r>
+            <a:r>
+              <a:rPr lang="fr-FR" dirty="0" err="1" smtClean="0"/>
+              <a:t>event</a:t>
+            </a:r>
+            <a:r>
+              <a:rPr lang="fr-FR" dirty="0" smtClean="0"/>
+              <a:t> </a:t>
+            </a:r>
+            <a:r>
+              <a:rPr lang="fr-FR" dirty="0" err="1" smtClean="0"/>
+              <a:t>is</a:t>
+            </a:r>
+            <a:r>
+              <a:rPr lang="fr-FR" dirty="0" smtClean="0"/>
+              <a:t> </a:t>
+            </a:r>
+            <a:r>
+              <a:rPr lang="fr-FR" dirty="0" err="1" smtClean="0"/>
+              <a:t>handled</a:t>
+            </a:r>
+            <a:r>
+              <a:rPr lang="fr-FR" dirty="0" smtClean="0"/>
+              <a:t> first and </a:t>
+            </a:r>
+            <a:r>
+              <a:rPr lang="fr-FR" dirty="0" err="1" smtClean="0"/>
+              <a:t>then</a:t>
+            </a:r>
+            <a:r>
+              <a:rPr lang="fr-FR" dirty="0" smtClean="0"/>
+              <a:t> the </a:t>
+            </a:r>
+            <a:r>
+              <a:rPr lang="fr-FR" dirty="0" err="1" smtClean="0"/>
+              <a:t>inner</a:t>
+            </a:r>
+            <a:r>
+              <a:rPr lang="fr-FR" dirty="0" smtClean="0"/>
+              <a:t>: the &lt;</a:t>
+            </a:r>
+            <a:r>
+              <a:rPr lang="fr-FR" dirty="0" err="1" smtClean="0"/>
+              <a:t>div</a:t>
+            </a:r>
+            <a:r>
+              <a:rPr lang="fr-FR" dirty="0" smtClean="0"/>
+              <a:t>&gt; </a:t>
+            </a:r>
+            <a:r>
+              <a:rPr lang="fr-FR" dirty="0" err="1" smtClean="0"/>
+              <a:t>element’s</a:t>
+            </a:r>
+            <a:r>
+              <a:rPr lang="fr-FR" dirty="0" smtClean="0"/>
+              <a:t> click </a:t>
+            </a:r>
+            <a:r>
+              <a:rPr lang="fr-FR" dirty="0" err="1" smtClean="0"/>
+              <a:t>event</a:t>
+            </a:r>
+            <a:r>
+              <a:rPr lang="fr-FR" dirty="0" smtClean="0"/>
+              <a:t> </a:t>
+            </a:r>
+            <a:r>
+              <a:rPr lang="fr-FR" dirty="0" err="1" smtClean="0"/>
+              <a:t>will</a:t>
+            </a:r>
+            <a:r>
+              <a:rPr lang="fr-FR" dirty="0" smtClean="0"/>
+              <a:t> </a:t>
+            </a:r>
+            <a:r>
+              <a:rPr lang="fr-FR" dirty="0" err="1" smtClean="0"/>
+              <a:t>be</a:t>
+            </a:r>
+            <a:r>
+              <a:rPr lang="fr-FR" dirty="0" smtClean="0"/>
+              <a:t> </a:t>
+            </a:r>
+            <a:r>
+              <a:rPr lang="fr-FR" dirty="0" err="1" smtClean="0"/>
+              <a:t>handled</a:t>
+            </a:r>
+            <a:r>
+              <a:rPr lang="fr-FR" dirty="0" smtClean="0"/>
+              <a:t> first </a:t>
+            </a:r>
+            <a:r>
+              <a:rPr lang="fr-FR" dirty="0" err="1" smtClean="0"/>
+              <a:t>then</a:t>
+            </a:r>
+            <a:r>
+              <a:rPr lang="fr-FR" dirty="0" smtClean="0"/>
+              <a:t> the &lt;</a:t>
+            </a:r>
+            <a:r>
+              <a:rPr lang="fr-FR" dirty="0" err="1" smtClean="0"/>
+              <a:t>img</a:t>
+            </a:r>
+            <a:r>
+              <a:rPr lang="fr-FR" dirty="0" smtClean="0"/>
+              <a:t>&gt; </a:t>
+            </a:r>
+            <a:r>
+              <a:rPr lang="fr-FR" dirty="0" err="1" smtClean="0"/>
+              <a:t>element’s</a:t>
+            </a:r>
+            <a:r>
+              <a:rPr lang="fr-FR" dirty="0" smtClean="0"/>
+              <a:t> click </a:t>
+            </a:r>
+            <a:r>
+              <a:rPr lang="fr-FR" dirty="0" err="1" smtClean="0"/>
+              <a:t>event</a:t>
+            </a:r>
+            <a:r>
+              <a:rPr lang="fr-FR" dirty="0" smtClean="0"/>
+              <a:t>.</a:t>
+            </a:r>
+          </a:p>
+          <a:p>
+            <a:r>
+              <a:rPr lang="fr-FR" dirty="0" err="1" smtClean="0"/>
+              <a:t>Exp</a:t>
+            </a:r>
+            <a:r>
+              <a:rPr lang="fr-FR" dirty="0" smtClean="0"/>
+              <a:t>:</a:t>
+            </a:r>
+          </a:p>
+          <a:p>
+            <a:r>
+              <a:rPr lang="fr-FR" dirty="0" err="1" smtClean="0"/>
+              <a:t>document.getElementById</a:t>
+            </a:r>
+            <a:r>
+              <a:rPr lang="fr-FR" dirty="0" smtClean="0"/>
+              <a:t>(‘img1’).</a:t>
+            </a:r>
+          </a:p>
+          <a:p>
+            <a:endParaRPr lang="fr-FR" dirty="0"/>
           </a:p>
         </p:txBody>
       </p:sp>

</xml_diff>